<commit_message>
Initial Commit for Presentation of Module 08 - Modules
</commit_message>
<xml_diff>
--- a/Modul_08_Modules/Modules.pptx
+++ b/Modul_08_Modules/Modules.pptx
@@ -5,10 +5,12 @@
     <p:sldMasterId id="2147483648" r:id="rId1"/>
   </p:sldMasterIdLst>
   <p:notesMasterIdLst>
-    <p:notesMasterId r:id="rId3"/>
+    <p:notesMasterId r:id="rId5"/>
   </p:notesMasterIdLst>
   <p:sldIdLst>
     <p:sldId id="257" r:id="rId2"/>
+    <p:sldId id="258" r:id="rId3"/>
+    <p:sldId id="259" r:id="rId4"/>
   </p:sldIdLst>
   <p:sldSz cx="12192000" cy="6858000"/>
   <p:notesSz cx="6858000" cy="9144000"/>
@@ -197,7 +199,7 @@
           <a:p>
             <a:fld id="{E9DAB8B5-B9A3-426D-91D9-D7966B0F2B79}" type="datetimeFigureOut">
               <a:rPr lang="de-DE" smtClean="0"/>
-              <a:t>13.11.2021</a:t>
+              <a:t>14.11.2021</a:t>
             </a:fld>
             <a:endParaRPr lang="de-DE"/>
           </a:p>
@@ -549,6 +551,174 @@
 </p:notes>
 </file>
 
+<file path=ppt/notesSlides/notesSlide2.xml><?xml version="1.0" encoding="utf-8"?>
+<p:notes xmlns:a="http://schemas.openxmlformats.org/drawingml/2006/main" xmlns:r="http://schemas.openxmlformats.org/officeDocument/2006/relationships" xmlns:p="http://schemas.openxmlformats.org/presentationml/2006/main">
+  <p:cSld>
+    <p:spTree>
+      <p:nvGrpSpPr>
+        <p:cNvPr id="1" name=""/>
+        <p:cNvGrpSpPr/>
+        <p:nvPr/>
+      </p:nvGrpSpPr>
+      <p:grpSpPr>
+        <a:xfrm>
+          <a:off x="0" y="0"/>
+          <a:ext cx="0" cy="0"/>
+          <a:chOff x="0" y="0"/>
+          <a:chExt cx="0" cy="0"/>
+        </a:xfrm>
+      </p:grpSpPr>
+      <p:sp>
+        <p:nvSpPr>
+          <p:cNvPr id="2" name="Folienbildplatzhalter 1"/>
+          <p:cNvSpPr>
+            <a:spLocks noGrp="1" noRot="1" noChangeAspect="1"/>
+          </p:cNvSpPr>
+          <p:nvPr>
+            <p:ph type="sldImg"/>
+          </p:nvPr>
+        </p:nvSpPr>
+        <p:spPr/>
+      </p:sp>
+      <p:sp>
+        <p:nvSpPr>
+          <p:cNvPr id="3" name="Notizenplatzhalter 2"/>
+          <p:cNvSpPr>
+            <a:spLocks noGrp="1"/>
+          </p:cNvSpPr>
+          <p:nvPr>
+            <p:ph type="body" idx="1"/>
+          </p:nvPr>
+        </p:nvSpPr>
+        <p:spPr/>
+        <p:txBody>
+          <a:bodyPr/>
+          <a:lstStyle/>
+          <a:p>
+            <a:endParaRPr lang="de-DE" dirty="0"/>
+          </a:p>
+        </p:txBody>
+      </p:sp>
+      <p:sp>
+        <p:nvSpPr>
+          <p:cNvPr id="4" name="Foliennummernplatzhalter 3"/>
+          <p:cNvSpPr>
+            <a:spLocks noGrp="1"/>
+          </p:cNvSpPr>
+          <p:nvPr>
+            <p:ph type="sldNum" sz="quarter" idx="10"/>
+          </p:nvPr>
+        </p:nvSpPr>
+        <p:spPr/>
+        <p:txBody>
+          <a:bodyPr/>
+          <a:lstStyle/>
+          <a:p>
+            <a:fld id="{E58C7EAB-645A-4FBB-B6AF-831236EEB6FB}" type="slidenum">
+              <a:rPr lang="de-DE" smtClean="0"/>
+              <a:t>2</a:t>
+            </a:fld>
+            <a:endParaRPr lang="de-DE"/>
+          </a:p>
+        </p:txBody>
+      </p:sp>
+    </p:spTree>
+    <p:extLst>
+      <p:ext uri="{BB962C8B-B14F-4D97-AF65-F5344CB8AC3E}">
+        <p14:creationId xmlns:p14="http://schemas.microsoft.com/office/powerpoint/2010/main" val="358908489"/>
+      </p:ext>
+    </p:extLst>
+  </p:cSld>
+  <p:clrMapOvr>
+    <a:masterClrMapping/>
+  </p:clrMapOvr>
+</p:notes>
+</file>
+
+<file path=ppt/notesSlides/notesSlide3.xml><?xml version="1.0" encoding="utf-8"?>
+<p:notes xmlns:a="http://schemas.openxmlformats.org/drawingml/2006/main" xmlns:r="http://schemas.openxmlformats.org/officeDocument/2006/relationships" xmlns:p="http://schemas.openxmlformats.org/presentationml/2006/main">
+  <p:cSld>
+    <p:spTree>
+      <p:nvGrpSpPr>
+        <p:cNvPr id="1" name=""/>
+        <p:cNvGrpSpPr/>
+        <p:nvPr/>
+      </p:nvGrpSpPr>
+      <p:grpSpPr>
+        <a:xfrm>
+          <a:off x="0" y="0"/>
+          <a:ext cx="0" cy="0"/>
+          <a:chOff x="0" y="0"/>
+          <a:chExt cx="0" cy="0"/>
+        </a:xfrm>
+      </p:grpSpPr>
+      <p:sp>
+        <p:nvSpPr>
+          <p:cNvPr id="2" name="Folienbildplatzhalter 1"/>
+          <p:cNvSpPr>
+            <a:spLocks noGrp="1" noRot="1" noChangeAspect="1"/>
+          </p:cNvSpPr>
+          <p:nvPr>
+            <p:ph type="sldImg"/>
+          </p:nvPr>
+        </p:nvSpPr>
+        <p:spPr/>
+      </p:sp>
+      <p:sp>
+        <p:nvSpPr>
+          <p:cNvPr id="3" name="Notizenplatzhalter 2"/>
+          <p:cNvSpPr>
+            <a:spLocks noGrp="1"/>
+          </p:cNvSpPr>
+          <p:nvPr>
+            <p:ph type="body" idx="1"/>
+          </p:nvPr>
+        </p:nvSpPr>
+        <p:spPr/>
+        <p:txBody>
+          <a:bodyPr/>
+          <a:lstStyle/>
+          <a:p>
+            <a:endParaRPr lang="de-DE" dirty="0"/>
+          </a:p>
+        </p:txBody>
+      </p:sp>
+      <p:sp>
+        <p:nvSpPr>
+          <p:cNvPr id="4" name="Foliennummernplatzhalter 3"/>
+          <p:cNvSpPr>
+            <a:spLocks noGrp="1"/>
+          </p:cNvSpPr>
+          <p:nvPr>
+            <p:ph type="sldNum" sz="quarter" idx="10"/>
+          </p:nvPr>
+        </p:nvSpPr>
+        <p:spPr/>
+        <p:txBody>
+          <a:bodyPr/>
+          <a:lstStyle/>
+          <a:p>
+            <a:fld id="{E58C7EAB-645A-4FBB-B6AF-831236EEB6FB}" type="slidenum">
+              <a:rPr lang="de-DE" smtClean="0"/>
+              <a:t>3</a:t>
+            </a:fld>
+            <a:endParaRPr lang="de-DE"/>
+          </a:p>
+        </p:txBody>
+      </p:sp>
+    </p:spTree>
+    <p:extLst>
+      <p:ext uri="{BB962C8B-B14F-4D97-AF65-F5344CB8AC3E}">
+        <p14:creationId xmlns:p14="http://schemas.microsoft.com/office/powerpoint/2010/main" val="1380042306"/>
+      </p:ext>
+    </p:extLst>
+  </p:cSld>
+  <p:clrMapOvr>
+    <a:masterClrMapping/>
+  </p:clrMapOvr>
+</p:notes>
+</file>
+
 <file path=ppt/slideLayouts/slideLayout1.xml><?xml version="1.0" encoding="utf-8"?>
 <p:sldLayout xmlns:a="http://schemas.openxmlformats.org/drawingml/2006/main" xmlns:r="http://schemas.openxmlformats.org/officeDocument/2006/relationships" xmlns:p="http://schemas.openxmlformats.org/presentationml/2006/main" type="title" preserve="1">
   <p:cSld name="Titelfolie">
@@ -680,7 +850,7 @@
           <a:p>
             <a:fld id="{6CBA03CC-73C5-46A8-8DFB-B5DC4577D8E2}" type="datetimeFigureOut">
               <a:rPr lang="de-DE" smtClean="0"/>
-              <a:t>13.11.2021</a:t>
+              <a:t>14.11.2021</a:t>
             </a:fld>
             <a:endParaRPr lang="de-DE"/>
           </a:p>
@@ -850,7 +1020,7 @@
           <a:p>
             <a:fld id="{6CBA03CC-73C5-46A8-8DFB-B5DC4577D8E2}" type="datetimeFigureOut">
               <a:rPr lang="de-DE" smtClean="0"/>
-              <a:t>13.11.2021</a:t>
+              <a:t>14.11.2021</a:t>
             </a:fld>
             <a:endParaRPr lang="de-DE"/>
           </a:p>
@@ -1030,7 +1200,7 @@
           <a:p>
             <a:fld id="{6CBA03CC-73C5-46A8-8DFB-B5DC4577D8E2}" type="datetimeFigureOut">
               <a:rPr lang="de-DE" smtClean="0"/>
-              <a:t>13.11.2021</a:t>
+              <a:t>14.11.2021</a:t>
             </a:fld>
             <a:endParaRPr lang="de-DE"/>
           </a:p>
@@ -1200,7 +1370,7 @@
           <a:p>
             <a:fld id="{6CBA03CC-73C5-46A8-8DFB-B5DC4577D8E2}" type="datetimeFigureOut">
               <a:rPr lang="de-DE" smtClean="0"/>
-              <a:t>13.11.2021</a:t>
+              <a:t>14.11.2021</a:t>
             </a:fld>
             <a:endParaRPr lang="de-DE"/>
           </a:p>
@@ -1446,7 +1616,7 @@
           <a:p>
             <a:fld id="{6CBA03CC-73C5-46A8-8DFB-B5DC4577D8E2}" type="datetimeFigureOut">
               <a:rPr lang="de-DE" smtClean="0"/>
-              <a:t>13.11.2021</a:t>
+              <a:t>14.11.2021</a:t>
             </a:fld>
             <a:endParaRPr lang="de-DE"/>
           </a:p>
@@ -1678,7 +1848,7 @@
           <a:p>
             <a:fld id="{6CBA03CC-73C5-46A8-8DFB-B5DC4577D8E2}" type="datetimeFigureOut">
               <a:rPr lang="de-DE" smtClean="0"/>
-              <a:t>13.11.2021</a:t>
+              <a:t>14.11.2021</a:t>
             </a:fld>
             <a:endParaRPr lang="de-DE"/>
           </a:p>
@@ -2045,7 +2215,7 @@
           <a:p>
             <a:fld id="{6CBA03CC-73C5-46A8-8DFB-B5DC4577D8E2}" type="datetimeFigureOut">
               <a:rPr lang="de-DE" smtClean="0"/>
-              <a:t>13.11.2021</a:t>
+              <a:t>14.11.2021</a:t>
             </a:fld>
             <a:endParaRPr lang="de-DE"/>
           </a:p>
@@ -2163,7 +2333,7 @@
           <a:p>
             <a:fld id="{6CBA03CC-73C5-46A8-8DFB-B5DC4577D8E2}" type="datetimeFigureOut">
               <a:rPr lang="de-DE" smtClean="0"/>
-              <a:t>13.11.2021</a:t>
+              <a:t>14.11.2021</a:t>
             </a:fld>
             <a:endParaRPr lang="de-DE"/>
           </a:p>
@@ -2258,7 +2428,7 @@
           <a:p>
             <a:fld id="{6CBA03CC-73C5-46A8-8DFB-B5DC4577D8E2}" type="datetimeFigureOut">
               <a:rPr lang="de-DE" smtClean="0"/>
-              <a:t>13.11.2021</a:t>
+              <a:t>14.11.2021</a:t>
             </a:fld>
             <a:endParaRPr lang="de-DE"/>
           </a:p>
@@ -2535,7 +2705,7 @@
           <a:p>
             <a:fld id="{6CBA03CC-73C5-46A8-8DFB-B5DC4577D8E2}" type="datetimeFigureOut">
               <a:rPr lang="de-DE" smtClean="0"/>
-              <a:t>13.11.2021</a:t>
+              <a:t>14.11.2021</a:t>
             </a:fld>
             <a:endParaRPr lang="de-DE"/>
           </a:p>
@@ -2788,7 +2958,7 @@
           <a:p>
             <a:fld id="{6CBA03CC-73C5-46A8-8DFB-B5DC4577D8E2}" type="datetimeFigureOut">
               <a:rPr lang="de-DE" smtClean="0"/>
-              <a:t>13.11.2021</a:t>
+              <a:t>14.11.2021</a:t>
             </a:fld>
             <a:endParaRPr lang="de-DE"/>
           </a:p>
@@ -3001,7 +3171,7 @@
           <a:p>
             <a:fld id="{6CBA03CC-73C5-46A8-8DFB-B5DC4577D8E2}" type="datetimeFigureOut">
               <a:rPr lang="de-DE" smtClean="0"/>
-              <a:t>13.11.2021</a:t>
+              <a:t>14.11.2021</a:t>
             </a:fld>
             <a:endParaRPr lang="de-DE"/>
           </a:p>
@@ -3449,17 +3619,2479 @@
           <a:bodyPr/>
           <a:lstStyle/>
           <a:p>
-            <a:pPr marL="0" indent="0">
-              <a:buNone/>
-            </a:pPr>
-            <a:endParaRPr lang="de-DE" dirty="0" smtClean="0"/>
-          </a:p>
-        </p:txBody>
-      </p:sp>
+            <a:r>
+              <a:rPr lang="de-DE" dirty="0" smtClean="0"/>
+              <a:t>Module fassen gemeinsam genutzte Ressourcen zusammen</a:t>
+            </a:r>
+          </a:p>
+          <a:p>
+            <a:r>
+              <a:rPr lang="de-DE" dirty="0" smtClean="0"/>
+              <a:t>Jede Terraform Konfiguration besteht aus dem Root-Modul und kann weitere Child-Module umfassen</a:t>
+            </a:r>
+          </a:p>
+          <a:p>
+            <a:r>
+              <a:rPr lang="de-DE" dirty="0" smtClean="0"/>
+              <a:t>Root-Modul umfasst alle Ressourcen </a:t>
+            </a:r>
+            <a:r>
+              <a:rPr lang="de-DE" dirty="0" smtClean="0"/>
+              <a:t>welche in den .</a:t>
+            </a:r>
+            <a:r>
+              <a:rPr lang="de-DE" dirty="0" err="1" smtClean="0"/>
+              <a:t>tf</a:t>
+            </a:r>
+            <a:r>
+              <a:rPr lang="de-DE" dirty="0" smtClean="0"/>
+              <a:t>-Dateien des Hauptverzeichnis definiert werden</a:t>
+            </a:r>
+          </a:p>
+          <a:p>
+            <a:r>
+              <a:rPr lang="de-DE" dirty="0" smtClean="0"/>
+              <a:t>Child-Module können lokal definiert oder aus</a:t>
+            </a:r>
+            <a:br>
+              <a:rPr lang="de-DE" dirty="0" smtClean="0"/>
+            </a:br>
+            <a:r>
+              <a:rPr lang="de-DE" dirty="0" smtClean="0"/>
+              <a:t>einer externen Registry geladen werden</a:t>
+            </a:r>
+          </a:p>
+        </p:txBody>
+      </p:sp>
+      <p:pic>
+        <p:nvPicPr>
+          <p:cNvPr id="5" name="Grafik 4"/>
+          <p:cNvPicPr>
+            <a:picLocks noChangeAspect="1"/>
+          </p:cNvPicPr>
+          <p:nvPr/>
+        </p:nvPicPr>
+        <p:blipFill>
+          <a:blip r:embed="rId3">
+            <a:extLst>
+              <a:ext uri="{28A0092B-C50C-407E-A947-70E740481C1C}">
+                <a14:useLocalDpi xmlns:a14="http://schemas.microsoft.com/office/drawing/2010/main" val="0"/>
+              </a:ext>
+            </a:extLst>
+          </a:blip>
+          <a:stretch>
+            <a:fillRect/>
+          </a:stretch>
+        </p:blipFill>
+        <p:spPr>
+          <a:xfrm>
+            <a:off x="7797800" y="4083050"/>
+            <a:ext cx="3962400" cy="2228850"/>
+          </a:xfrm>
+          <a:prstGeom prst="rect">
+            <a:avLst/>
+          </a:prstGeom>
+        </p:spPr>
+      </p:pic>
     </p:spTree>
     <p:extLst>
       <p:ext uri="{BB962C8B-B14F-4D97-AF65-F5344CB8AC3E}">
         <p14:creationId xmlns:p14="http://schemas.microsoft.com/office/powerpoint/2010/main" val="2162453654"/>
+      </p:ext>
+    </p:extLst>
+  </p:cSld>
+  <p:clrMapOvr>
+    <a:masterClrMapping/>
+  </p:clrMapOvr>
+  <p:timing>
+    <p:tnLst>
+      <p:par>
+        <p:cTn id="1" dur="indefinite" restart="never" nodeType="tmRoot"/>
+      </p:par>
+    </p:tnLst>
+  </p:timing>
+</p:sld>
+</file>
+
+<file path=ppt/slides/slide2.xml><?xml version="1.0" encoding="utf-8"?>
+<p:sld xmlns:a="http://schemas.openxmlformats.org/drawingml/2006/main" xmlns:r="http://schemas.openxmlformats.org/officeDocument/2006/relationships" xmlns:p="http://schemas.openxmlformats.org/presentationml/2006/main">
+  <p:cSld>
+    <p:spTree>
+      <p:nvGrpSpPr>
+        <p:cNvPr id="1" name=""/>
+        <p:cNvGrpSpPr/>
+        <p:nvPr/>
+      </p:nvGrpSpPr>
+      <p:grpSpPr>
+        <a:xfrm>
+          <a:off x="0" y="0"/>
+          <a:ext cx="0" cy="0"/>
+          <a:chOff x="0" y="0"/>
+          <a:chExt cx="0" cy="0"/>
+        </a:xfrm>
+      </p:grpSpPr>
+      <p:sp>
+        <p:nvSpPr>
+          <p:cNvPr id="2" name="Titel 1"/>
+          <p:cNvSpPr>
+            <a:spLocks noGrp="1"/>
+          </p:cNvSpPr>
+          <p:nvPr>
+            <p:ph type="title"/>
+          </p:nvPr>
+        </p:nvSpPr>
+        <p:spPr/>
+        <p:txBody>
+          <a:bodyPr/>
+          <a:lstStyle/>
+          <a:p>
+            <a:r>
+              <a:rPr lang="de-DE" dirty="0" smtClean="0"/>
+              <a:t>Module Definition</a:t>
+            </a:r>
+            <a:endParaRPr lang="de-DE" dirty="0"/>
+          </a:p>
+        </p:txBody>
+      </p:sp>
+      <p:sp>
+        <p:nvSpPr>
+          <p:cNvPr id="4" name="Rectangle 1"/>
+          <p:cNvSpPr>
+            <a:spLocks noChangeArrowheads="1"/>
+          </p:cNvSpPr>
+          <p:nvPr/>
+        </p:nvSpPr>
+        <p:spPr bwMode="auto">
+          <a:xfrm>
+            <a:off x="2459567" y="1843088"/>
+            <a:ext cx="7272866" cy="4708981"/>
+          </a:xfrm>
+          <a:prstGeom prst="rect">
+            <a:avLst/>
+          </a:prstGeom>
+          <a:solidFill>
+            <a:srgbClr val="282C34"/>
+          </a:solidFill>
+          <a:ln>
+            <a:noFill/>
+          </a:ln>
+          <a:effectLst/>
+          <a:extLst>
+            <a:ext uri="{91240B29-F687-4F45-9708-019B960494DF}">
+              <a14:hiddenLine xmlns:a14="http://schemas.microsoft.com/office/drawing/2010/main" w="9525">
+                <a:solidFill>
+                  <a:schemeClr val="tx1"/>
+                </a:solidFill>
+                <a:miter lim="800000"/>
+                <a:headEnd/>
+                <a:tailEnd/>
+              </a14:hiddenLine>
+            </a:ext>
+            <a:ext uri="{AF507438-7753-43E0-B8FC-AC1667EBCBE1}">
+              <a14:hiddenEffects xmlns:a14="http://schemas.microsoft.com/office/drawing/2010/main">
+                <a:effectLst>
+                  <a:outerShdw dist="35921" dir="2700000" algn="ctr" rotWithShape="0">
+                    <a:schemeClr val="bg2"/>
+                  </a:outerShdw>
+                </a:effectLst>
+              </a14:hiddenEffects>
+            </a:ext>
+          </a:extLst>
+        </p:spPr>
+        <p:txBody>
+          <a:bodyPr vert="horz" wrap="square" lIns="91440" tIns="45720" rIns="91440" bIns="45720" numCol="1" anchor="ctr" anchorCtr="0" compatLnSpc="1">
+            <a:prstTxWarp prst="textNoShape">
+              <a:avLst/>
+            </a:prstTxWarp>
+            <a:spAutoFit/>
+          </a:bodyPr>
+          <a:lstStyle/>
+          <a:p>
+            <a:pPr marL="0" marR="0" lvl="0" indent="0" algn="l" defTabSz="914400" rtl="0" eaLnBrk="0" fontAlgn="base" latinLnBrk="0" hangingPunct="0">
+              <a:lnSpc>
+                <a:spcPct val="100000"/>
+              </a:lnSpc>
+              <a:spcBef>
+                <a:spcPct val="0"/>
+              </a:spcBef>
+              <a:spcAft>
+                <a:spcPct val="0"/>
+              </a:spcAft>
+              <a:buClrTx/>
+              <a:buSzTx/>
+              <a:buFontTx/>
+              <a:buNone/>
+              <a:tabLst/>
+            </a:pPr>
+            <a:r>
+              <a:rPr kumimoji="0" lang="de-DE" altLang="de-DE" sz="2000" b="0" i="1" u="none" strike="noStrike" cap="none" normalizeH="0" baseline="0" dirty="0" err="1" smtClean="0">
+                <a:ln>
+                  <a:noFill/>
+                </a:ln>
+                <a:solidFill>
+                  <a:srgbClr val="D55FDE"/>
+                </a:solidFill>
+                <a:effectLst/>
+                <a:latin typeface="JetBrains Mono"/>
+              </a:rPr>
+              <a:t>module</a:t>
+            </a:r>
+            <a:r>
+              <a:rPr kumimoji="0" lang="de-DE" altLang="de-DE" sz="2000" b="0" i="1" u="none" strike="noStrike" cap="none" normalizeH="0" baseline="0" dirty="0" smtClean="0">
+                <a:ln>
+                  <a:noFill/>
+                </a:ln>
+                <a:solidFill>
+                  <a:srgbClr val="D55FDE"/>
+                </a:solidFill>
+                <a:effectLst/>
+                <a:latin typeface="JetBrains Mono"/>
+              </a:rPr>
+              <a:t> </a:t>
+            </a:r>
+            <a:r>
+              <a:rPr kumimoji="0" lang="de-DE" altLang="de-DE" sz="2000" b="0" i="0" u="none" strike="noStrike" cap="none" normalizeH="0" baseline="0" dirty="0" smtClean="0">
+                <a:ln>
+                  <a:noFill/>
+                </a:ln>
+                <a:solidFill>
+                  <a:srgbClr val="E5C07B"/>
+                </a:solidFill>
+                <a:effectLst/>
+                <a:latin typeface="JetBrains Mono"/>
+              </a:rPr>
+              <a:t>"</a:t>
+            </a:r>
+            <a:r>
+              <a:rPr kumimoji="0" lang="de-DE" altLang="de-DE" sz="2000" b="0" i="0" u="none" strike="noStrike" cap="none" normalizeH="0" baseline="0" dirty="0" err="1" smtClean="0">
+                <a:ln>
+                  <a:noFill/>
+                </a:ln>
+                <a:solidFill>
+                  <a:srgbClr val="E5C07B"/>
+                </a:solidFill>
+                <a:effectLst/>
+                <a:latin typeface="JetBrains Mono"/>
+              </a:rPr>
+              <a:t>documentdb</a:t>
+            </a:r>
+            <a:r>
+              <a:rPr kumimoji="0" lang="de-DE" altLang="de-DE" sz="2000" b="0" i="0" u="none" strike="noStrike" cap="none" normalizeH="0" baseline="0" dirty="0" smtClean="0">
+                <a:ln>
+                  <a:noFill/>
+                </a:ln>
+                <a:solidFill>
+                  <a:srgbClr val="E5C07B"/>
+                </a:solidFill>
+                <a:effectLst/>
+                <a:latin typeface="JetBrains Mono"/>
+              </a:rPr>
+              <a:t>" </a:t>
+            </a:r>
+            <a:r>
+              <a:rPr kumimoji="0" lang="de-DE" altLang="de-DE" sz="2000" b="0" i="0" u="none" strike="noStrike" cap="none" normalizeH="0" baseline="0" dirty="0" smtClean="0">
+                <a:ln>
+                  <a:noFill/>
+                </a:ln>
+                <a:solidFill>
+                  <a:srgbClr val="BBBBBB"/>
+                </a:solidFill>
+                <a:effectLst/>
+                <a:latin typeface="JetBrains Mono"/>
+              </a:rPr>
+              <a:t>{</a:t>
+            </a:r>
+            <a:br>
+              <a:rPr kumimoji="0" lang="de-DE" altLang="de-DE" sz="2000" b="0" i="0" u="none" strike="noStrike" cap="none" normalizeH="0" baseline="0" dirty="0" smtClean="0">
+                <a:ln>
+                  <a:noFill/>
+                </a:ln>
+                <a:solidFill>
+                  <a:srgbClr val="BBBBBB"/>
+                </a:solidFill>
+                <a:effectLst/>
+                <a:latin typeface="JetBrains Mono"/>
+              </a:rPr>
+            </a:br>
+            <a:r>
+              <a:rPr kumimoji="0" lang="de-DE" altLang="de-DE" sz="2000" b="0" i="0" u="none" strike="noStrike" cap="none" normalizeH="0" baseline="0" dirty="0" smtClean="0">
+                <a:ln>
+                  <a:noFill/>
+                </a:ln>
+                <a:solidFill>
+                  <a:srgbClr val="BBBBBB"/>
+                </a:solidFill>
+                <a:effectLst/>
+                <a:latin typeface="JetBrains Mono"/>
+              </a:rPr>
+              <a:t>  </a:t>
+            </a:r>
+            <a:r>
+              <a:rPr kumimoji="0" lang="de-DE" altLang="de-DE" sz="2000" b="0" i="0" u="none" strike="noStrike" cap="none" normalizeH="0" baseline="0" dirty="0" err="1" smtClean="0">
+                <a:ln>
+                  <a:noFill/>
+                </a:ln>
+                <a:solidFill>
+                  <a:srgbClr val="EF596F"/>
+                </a:solidFill>
+                <a:effectLst/>
+                <a:latin typeface="JetBrains Mono"/>
+              </a:rPr>
+              <a:t>source</a:t>
+            </a:r>
+            <a:r>
+              <a:rPr kumimoji="0" lang="de-DE" altLang="de-DE" sz="2000" b="0" i="0" u="none" strike="noStrike" cap="none" normalizeH="0" baseline="0" dirty="0" smtClean="0">
+                <a:ln>
+                  <a:noFill/>
+                </a:ln>
+                <a:solidFill>
+                  <a:srgbClr val="EF596F"/>
+                </a:solidFill>
+                <a:effectLst/>
+                <a:latin typeface="JetBrains Mono"/>
+              </a:rPr>
+              <a:t> </a:t>
+            </a:r>
+            <a:r>
+              <a:rPr kumimoji="0" lang="de-DE" altLang="de-DE" sz="2000" b="0" i="0" u="none" strike="noStrike" cap="none" normalizeH="0" baseline="0" dirty="0" smtClean="0">
+                <a:ln>
+                  <a:noFill/>
+                </a:ln>
+                <a:solidFill>
+                  <a:srgbClr val="BBBBBB"/>
+                </a:solidFill>
+                <a:effectLst/>
+                <a:latin typeface="JetBrains Mono"/>
+              </a:rPr>
+              <a:t>= </a:t>
+            </a:r>
+            <a:r>
+              <a:rPr kumimoji="0" lang="de-DE" altLang="de-DE" sz="2000" b="0" i="0" u="none" strike="noStrike" cap="none" normalizeH="0" baseline="0" dirty="0" smtClean="0">
+                <a:ln>
+                  <a:noFill/>
+                </a:ln>
+                <a:solidFill>
+                  <a:srgbClr val="89CA78"/>
+                </a:solidFill>
+                <a:effectLst/>
+                <a:latin typeface="JetBrains Mono"/>
+              </a:rPr>
+              <a:t>"./</a:t>
+            </a:r>
+            <a:r>
+              <a:rPr kumimoji="0" lang="de-DE" altLang="de-DE" sz="2000" b="0" i="0" u="none" strike="noStrike" cap="none" normalizeH="0" baseline="0" dirty="0" err="1" smtClean="0">
+                <a:ln>
+                  <a:noFill/>
+                </a:ln>
+                <a:solidFill>
+                  <a:srgbClr val="89CA78"/>
+                </a:solidFill>
+                <a:effectLst/>
+                <a:latin typeface="JetBrains Mono"/>
+              </a:rPr>
+              <a:t>documentdb</a:t>
+            </a:r>
+            <a:r>
+              <a:rPr kumimoji="0" lang="de-DE" altLang="de-DE" sz="2000" b="0" i="0" u="none" strike="noStrike" cap="none" normalizeH="0" baseline="0" dirty="0" smtClean="0">
+                <a:ln>
+                  <a:noFill/>
+                </a:ln>
+                <a:solidFill>
+                  <a:srgbClr val="89CA78"/>
+                </a:solidFill>
+                <a:effectLst/>
+                <a:latin typeface="JetBrains Mono"/>
+              </a:rPr>
+              <a:t>"</a:t>
+            </a:r>
+            <a:br>
+              <a:rPr kumimoji="0" lang="de-DE" altLang="de-DE" sz="2000" b="0" i="0" u="none" strike="noStrike" cap="none" normalizeH="0" baseline="0" dirty="0" smtClean="0">
+                <a:ln>
+                  <a:noFill/>
+                </a:ln>
+                <a:solidFill>
+                  <a:srgbClr val="89CA78"/>
+                </a:solidFill>
+                <a:effectLst/>
+                <a:latin typeface="JetBrains Mono"/>
+              </a:rPr>
+            </a:br>
+            <a:r>
+              <a:rPr kumimoji="0" lang="de-DE" altLang="de-DE" sz="2000" b="0" i="0" u="none" strike="noStrike" cap="none" normalizeH="0" baseline="0" dirty="0" smtClean="0">
+                <a:ln>
+                  <a:noFill/>
+                </a:ln>
+                <a:solidFill>
+                  <a:srgbClr val="89CA78"/>
+                </a:solidFill>
+                <a:effectLst/>
+                <a:latin typeface="JetBrains Mono"/>
+              </a:rPr>
+              <a:t>  </a:t>
+            </a:r>
+            <a:r>
+              <a:rPr kumimoji="0" lang="de-DE" altLang="de-DE" sz="2000" b="0" i="0" u="none" strike="noStrike" cap="none" normalizeH="0" baseline="0" dirty="0" err="1" smtClean="0">
+                <a:ln>
+                  <a:noFill/>
+                </a:ln>
+                <a:solidFill>
+                  <a:srgbClr val="EF596F"/>
+                </a:solidFill>
+                <a:effectLst/>
+                <a:latin typeface="JetBrains Mono"/>
+              </a:rPr>
+              <a:t>project</a:t>
+            </a:r>
+            <a:r>
+              <a:rPr kumimoji="0" lang="de-DE" altLang="de-DE" sz="2000" b="0" i="0" u="none" strike="noStrike" cap="none" normalizeH="0" baseline="0" dirty="0" smtClean="0">
+                <a:ln>
+                  <a:noFill/>
+                </a:ln>
+                <a:solidFill>
+                  <a:srgbClr val="EF596F"/>
+                </a:solidFill>
+                <a:effectLst/>
+                <a:latin typeface="JetBrains Mono"/>
+              </a:rPr>
+              <a:t> </a:t>
+            </a:r>
+            <a:r>
+              <a:rPr kumimoji="0" lang="de-DE" altLang="de-DE" sz="2000" b="0" i="0" u="none" strike="noStrike" cap="none" normalizeH="0" baseline="0" dirty="0" smtClean="0">
+                <a:ln>
+                  <a:noFill/>
+                </a:ln>
+                <a:solidFill>
+                  <a:srgbClr val="BBBBBB"/>
+                </a:solidFill>
+                <a:effectLst/>
+                <a:latin typeface="JetBrains Mono"/>
+              </a:rPr>
+              <a:t>= </a:t>
+            </a:r>
+            <a:r>
+              <a:rPr kumimoji="0" lang="de-DE" altLang="de-DE" sz="2000" b="0" i="0" u="none" strike="noStrike" cap="none" normalizeH="0" baseline="0" dirty="0" err="1" smtClean="0">
+                <a:ln>
+                  <a:noFill/>
+                </a:ln>
+                <a:solidFill>
+                  <a:srgbClr val="BBBBBB"/>
+                </a:solidFill>
+                <a:effectLst/>
+                <a:latin typeface="JetBrains Mono"/>
+              </a:rPr>
+              <a:t>local.</a:t>
+            </a:r>
+            <a:r>
+              <a:rPr kumimoji="0" lang="de-DE" altLang="de-DE" sz="2000" b="0" i="0" u="none" strike="noStrike" cap="none" normalizeH="0" baseline="0" dirty="0" err="1" smtClean="0">
+                <a:ln>
+                  <a:noFill/>
+                </a:ln>
+                <a:solidFill>
+                  <a:srgbClr val="EF596F"/>
+                </a:solidFill>
+                <a:effectLst/>
+                <a:latin typeface="JetBrains Mono"/>
+              </a:rPr>
+              <a:t>project</a:t>
+            </a:r>
+            <a:r>
+              <a:rPr kumimoji="0" lang="de-DE" altLang="de-DE" sz="2000" b="0" i="0" u="none" strike="noStrike" cap="none" normalizeH="0" baseline="0" dirty="0" smtClean="0">
+                <a:ln>
+                  <a:noFill/>
+                </a:ln>
+                <a:solidFill>
+                  <a:srgbClr val="EF596F"/>
+                </a:solidFill>
+                <a:effectLst/>
+                <a:latin typeface="JetBrains Mono"/>
+              </a:rPr>
+              <a:t/>
+            </a:r>
+            <a:br>
+              <a:rPr kumimoji="0" lang="de-DE" altLang="de-DE" sz="2000" b="0" i="0" u="none" strike="noStrike" cap="none" normalizeH="0" baseline="0" dirty="0" smtClean="0">
+                <a:ln>
+                  <a:noFill/>
+                </a:ln>
+                <a:solidFill>
+                  <a:srgbClr val="EF596F"/>
+                </a:solidFill>
+                <a:effectLst/>
+                <a:latin typeface="JetBrains Mono"/>
+              </a:rPr>
+            </a:br>
+            <a:r>
+              <a:rPr kumimoji="0" lang="de-DE" altLang="de-DE" sz="2000" b="0" i="0" u="none" strike="noStrike" cap="none" normalizeH="0" baseline="0" dirty="0" smtClean="0">
+                <a:ln>
+                  <a:noFill/>
+                </a:ln>
+                <a:solidFill>
+                  <a:srgbClr val="EF596F"/>
+                </a:solidFill>
+                <a:effectLst/>
+                <a:latin typeface="JetBrains Mono"/>
+              </a:rPr>
+              <a:t>  </a:t>
+            </a:r>
+            <a:r>
+              <a:rPr kumimoji="0" lang="de-DE" altLang="de-DE" sz="2000" b="0" i="0" u="none" strike="noStrike" cap="none" normalizeH="0" baseline="0" dirty="0" err="1" smtClean="0">
+                <a:ln>
+                  <a:noFill/>
+                </a:ln>
+                <a:solidFill>
+                  <a:srgbClr val="EF596F"/>
+                </a:solidFill>
+                <a:effectLst/>
+                <a:latin typeface="JetBrains Mono"/>
+              </a:rPr>
+              <a:t>env</a:t>
+            </a:r>
+            <a:r>
+              <a:rPr kumimoji="0" lang="de-DE" altLang="de-DE" sz="2000" b="0" i="0" u="none" strike="noStrike" cap="none" normalizeH="0" baseline="0" dirty="0" smtClean="0">
+                <a:ln>
+                  <a:noFill/>
+                </a:ln>
+                <a:solidFill>
+                  <a:srgbClr val="EF596F"/>
+                </a:solidFill>
+                <a:effectLst/>
+                <a:latin typeface="JetBrains Mono"/>
+              </a:rPr>
+              <a:t>     </a:t>
+            </a:r>
+            <a:r>
+              <a:rPr kumimoji="0" lang="de-DE" altLang="de-DE" sz="2000" b="0" i="0" u="none" strike="noStrike" cap="none" normalizeH="0" baseline="0" dirty="0" smtClean="0">
+                <a:ln>
+                  <a:noFill/>
+                </a:ln>
+                <a:solidFill>
+                  <a:srgbClr val="BBBBBB"/>
+                </a:solidFill>
+                <a:effectLst/>
+                <a:latin typeface="JetBrains Mono"/>
+              </a:rPr>
+              <a:t>= </a:t>
+            </a:r>
+            <a:r>
+              <a:rPr kumimoji="0" lang="de-DE" altLang="de-DE" sz="2000" b="0" i="0" u="none" strike="noStrike" cap="none" normalizeH="0" baseline="0" dirty="0" err="1" smtClean="0">
+                <a:ln>
+                  <a:noFill/>
+                </a:ln>
+                <a:solidFill>
+                  <a:srgbClr val="BBBBBB"/>
+                </a:solidFill>
+                <a:effectLst/>
+                <a:latin typeface="JetBrains Mono"/>
+              </a:rPr>
+              <a:t>local.</a:t>
+            </a:r>
+            <a:r>
+              <a:rPr kumimoji="0" lang="de-DE" altLang="de-DE" sz="2000" b="0" i="0" u="none" strike="noStrike" cap="none" normalizeH="0" baseline="0" dirty="0" err="1" smtClean="0">
+                <a:ln>
+                  <a:noFill/>
+                </a:ln>
+                <a:solidFill>
+                  <a:srgbClr val="EF596F"/>
+                </a:solidFill>
+                <a:effectLst/>
+                <a:latin typeface="JetBrains Mono"/>
+              </a:rPr>
+              <a:t>env</a:t>
+            </a:r>
+            <a:r>
+              <a:rPr kumimoji="0" lang="de-DE" altLang="de-DE" sz="2000" b="0" i="0" u="none" strike="noStrike" cap="none" normalizeH="0" baseline="0" dirty="0" smtClean="0">
+                <a:ln>
+                  <a:noFill/>
+                </a:ln>
+                <a:solidFill>
+                  <a:srgbClr val="EF596F"/>
+                </a:solidFill>
+                <a:effectLst/>
+                <a:latin typeface="JetBrains Mono"/>
+              </a:rPr>
+              <a:t/>
+            </a:r>
+            <a:br>
+              <a:rPr kumimoji="0" lang="de-DE" altLang="de-DE" sz="2000" b="0" i="0" u="none" strike="noStrike" cap="none" normalizeH="0" baseline="0" dirty="0" smtClean="0">
+                <a:ln>
+                  <a:noFill/>
+                </a:ln>
+                <a:solidFill>
+                  <a:srgbClr val="EF596F"/>
+                </a:solidFill>
+                <a:effectLst/>
+                <a:latin typeface="JetBrains Mono"/>
+              </a:rPr>
+            </a:br>
+            <a:r>
+              <a:rPr kumimoji="0" lang="de-DE" altLang="de-DE" sz="2000" b="0" i="0" u="none" strike="noStrike" cap="none" normalizeH="0" baseline="0" dirty="0" smtClean="0">
+                <a:ln>
+                  <a:noFill/>
+                </a:ln>
+                <a:solidFill>
+                  <a:srgbClr val="EF596F"/>
+                </a:solidFill>
+                <a:effectLst/>
+                <a:latin typeface="JetBrains Mono"/>
+              </a:rPr>
+              <a:t>  tags    </a:t>
+            </a:r>
+            <a:r>
+              <a:rPr kumimoji="0" lang="de-DE" altLang="de-DE" sz="2000" b="0" i="0" u="none" strike="noStrike" cap="none" normalizeH="0" baseline="0" dirty="0" smtClean="0">
+                <a:ln>
+                  <a:noFill/>
+                </a:ln>
+                <a:solidFill>
+                  <a:srgbClr val="BBBBBB"/>
+                </a:solidFill>
+                <a:effectLst/>
+                <a:latin typeface="JetBrains Mono"/>
+              </a:rPr>
+              <a:t>= </a:t>
+            </a:r>
+            <a:r>
+              <a:rPr kumimoji="0" lang="de-DE" altLang="de-DE" sz="2000" b="0" i="0" u="none" strike="noStrike" cap="none" normalizeH="0" baseline="0" dirty="0" err="1" smtClean="0">
+                <a:ln>
+                  <a:noFill/>
+                </a:ln>
+                <a:solidFill>
+                  <a:srgbClr val="BBBBBB"/>
+                </a:solidFill>
+                <a:effectLst/>
+                <a:latin typeface="JetBrains Mono"/>
+              </a:rPr>
+              <a:t>local.</a:t>
+            </a:r>
+            <a:r>
+              <a:rPr kumimoji="0" lang="de-DE" altLang="de-DE" sz="2000" b="0" i="0" u="none" strike="noStrike" cap="none" normalizeH="0" baseline="0" dirty="0" err="1" smtClean="0">
+                <a:ln>
+                  <a:noFill/>
+                </a:ln>
+                <a:solidFill>
+                  <a:srgbClr val="EF596F"/>
+                </a:solidFill>
+                <a:effectLst/>
+                <a:latin typeface="JetBrains Mono"/>
+              </a:rPr>
+              <a:t>tags</a:t>
+            </a:r>
+            <a:r>
+              <a:rPr kumimoji="0" lang="de-DE" altLang="de-DE" sz="2000" b="0" i="0" u="none" strike="noStrike" cap="none" normalizeH="0" baseline="0" dirty="0" smtClean="0">
+                <a:ln>
+                  <a:noFill/>
+                </a:ln>
+                <a:solidFill>
+                  <a:srgbClr val="EF596F"/>
+                </a:solidFill>
+                <a:effectLst/>
+                <a:latin typeface="JetBrains Mono"/>
+              </a:rPr>
+              <a:t/>
+            </a:r>
+            <a:br>
+              <a:rPr kumimoji="0" lang="de-DE" altLang="de-DE" sz="2000" b="0" i="0" u="none" strike="noStrike" cap="none" normalizeH="0" baseline="0" dirty="0" smtClean="0">
+                <a:ln>
+                  <a:noFill/>
+                </a:ln>
+                <a:solidFill>
+                  <a:srgbClr val="EF596F"/>
+                </a:solidFill>
+                <a:effectLst/>
+                <a:latin typeface="JetBrains Mono"/>
+              </a:rPr>
+            </a:br>
+            <a:r>
+              <a:rPr kumimoji="0" lang="de-DE" altLang="de-DE" sz="2000" b="0" i="0" u="none" strike="noStrike" cap="none" normalizeH="0" baseline="0" dirty="0" smtClean="0">
+                <a:ln>
+                  <a:noFill/>
+                </a:ln>
+                <a:solidFill>
+                  <a:srgbClr val="EF596F"/>
+                </a:solidFill>
+                <a:effectLst/>
+                <a:latin typeface="JetBrains Mono"/>
+              </a:rPr>
+              <a:t>  </a:t>
+            </a:r>
+            <a:r>
+              <a:rPr kumimoji="0" lang="de-DE" altLang="de-DE" sz="2000" b="0" i="0" u="none" strike="noStrike" cap="none" normalizeH="0" baseline="0" dirty="0" err="1" smtClean="0">
+                <a:ln>
+                  <a:noFill/>
+                </a:ln>
+                <a:solidFill>
+                  <a:srgbClr val="EF596F"/>
+                </a:solidFill>
+                <a:effectLst/>
+                <a:latin typeface="JetBrains Mono"/>
+              </a:rPr>
+              <a:t>region</a:t>
+            </a:r>
+            <a:r>
+              <a:rPr kumimoji="0" lang="de-DE" altLang="de-DE" sz="2000" b="0" i="0" u="none" strike="noStrike" cap="none" normalizeH="0" baseline="0" dirty="0" smtClean="0">
+                <a:ln>
+                  <a:noFill/>
+                </a:ln>
+                <a:solidFill>
+                  <a:srgbClr val="EF596F"/>
+                </a:solidFill>
+                <a:effectLst/>
+                <a:latin typeface="JetBrains Mono"/>
+              </a:rPr>
+              <a:t> </a:t>
+            </a:r>
+            <a:r>
+              <a:rPr kumimoji="0" lang="de-DE" altLang="de-DE" sz="2000" b="0" i="0" u="none" strike="noStrike" cap="none" normalizeH="0" baseline="0" dirty="0" smtClean="0">
+                <a:ln>
+                  <a:noFill/>
+                </a:ln>
+                <a:solidFill>
+                  <a:srgbClr val="BBBBBB"/>
+                </a:solidFill>
+                <a:effectLst/>
+                <a:latin typeface="JetBrains Mono"/>
+              </a:rPr>
+              <a:t>= </a:t>
+            </a:r>
+            <a:r>
+              <a:rPr kumimoji="0" lang="de-DE" altLang="de-DE" sz="2000" b="0" i="0" u="none" strike="noStrike" cap="none" normalizeH="0" baseline="0" dirty="0" err="1" smtClean="0">
+                <a:ln>
+                  <a:noFill/>
+                </a:ln>
+                <a:solidFill>
+                  <a:srgbClr val="BBBBBB"/>
+                </a:solidFill>
+                <a:effectLst/>
+                <a:latin typeface="JetBrains Mono"/>
+              </a:rPr>
+              <a:t>local.</a:t>
+            </a:r>
+            <a:r>
+              <a:rPr kumimoji="0" lang="de-DE" altLang="de-DE" sz="2000" b="0" i="0" u="none" strike="noStrike" cap="none" normalizeH="0" baseline="0" dirty="0" err="1" smtClean="0">
+                <a:ln>
+                  <a:noFill/>
+                </a:ln>
+                <a:solidFill>
+                  <a:srgbClr val="EF596F"/>
+                </a:solidFill>
+                <a:effectLst/>
+                <a:latin typeface="JetBrains Mono"/>
+              </a:rPr>
+              <a:t>region</a:t>
+            </a:r>
+            <a:r>
+              <a:rPr kumimoji="0" lang="de-DE" altLang="de-DE" sz="2000" b="0" i="0" u="none" strike="noStrike" cap="none" normalizeH="0" baseline="0" dirty="0" smtClean="0">
+                <a:ln>
+                  <a:noFill/>
+                </a:ln>
+                <a:solidFill>
+                  <a:srgbClr val="EF596F"/>
+                </a:solidFill>
+                <a:effectLst/>
+                <a:latin typeface="JetBrains Mono"/>
+              </a:rPr>
+              <a:t/>
+            </a:r>
+            <a:br>
+              <a:rPr kumimoji="0" lang="de-DE" altLang="de-DE" sz="2000" b="0" i="0" u="none" strike="noStrike" cap="none" normalizeH="0" baseline="0" dirty="0" smtClean="0">
+                <a:ln>
+                  <a:noFill/>
+                </a:ln>
+                <a:solidFill>
+                  <a:srgbClr val="EF596F"/>
+                </a:solidFill>
+                <a:effectLst/>
+                <a:latin typeface="JetBrains Mono"/>
+              </a:rPr>
+            </a:br>
+            <a:r>
+              <a:rPr kumimoji="0" lang="de-DE" altLang="de-DE" sz="2000" b="0" i="0" u="none" strike="noStrike" cap="none" normalizeH="0" baseline="0" dirty="0" smtClean="0">
+                <a:ln>
+                  <a:noFill/>
+                </a:ln>
+                <a:solidFill>
+                  <a:srgbClr val="EF596F"/>
+                </a:solidFill>
+                <a:effectLst/>
+                <a:latin typeface="JetBrains Mono"/>
+              </a:rPr>
+              <a:t>  </a:t>
+            </a:r>
+            <a:r>
+              <a:rPr kumimoji="0" lang="de-DE" altLang="de-DE" sz="2000" b="0" i="0" u="none" strike="noStrike" cap="none" normalizeH="0" baseline="0" dirty="0" err="1" smtClean="0">
+                <a:ln>
+                  <a:noFill/>
+                </a:ln>
+                <a:solidFill>
+                  <a:srgbClr val="EF596F"/>
+                </a:solidFill>
+                <a:effectLst/>
+                <a:latin typeface="JetBrains Mono"/>
+              </a:rPr>
+              <a:t>instance_config</a:t>
+            </a:r>
+            <a:r>
+              <a:rPr kumimoji="0" lang="de-DE" altLang="de-DE" sz="2000" b="0" i="0" u="none" strike="noStrike" cap="none" normalizeH="0" baseline="0" dirty="0" smtClean="0">
+                <a:ln>
+                  <a:noFill/>
+                </a:ln>
+                <a:solidFill>
+                  <a:srgbClr val="EF596F"/>
+                </a:solidFill>
+                <a:effectLst/>
+                <a:latin typeface="JetBrains Mono"/>
+              </a:rPr>
+              <a:t>  </a:t>
+            </a:r>
+            <a:r>
+              <a:rPr kumimoji="0" lang="de-DE" altLang="de-DE" sz="2000" b="0" i="0" u="none" strike="noStrike" cap="none" normalizeH="0" baseline="0" dirty="0" smtClean="0">
+                <a:ln>
+                  <a:noFill/>
+                </a:ln>
+                <a:solidFill>
+                  <a:srgbClr val="BBBBBB"/>
+                </a:solidFill>
+                <a:effectLst/>
+                <a:latin typeface="JetBrains Mono"/>
+              </a:rPr>
+              <a:t>= {</a:t>
+            </a:r>
+            <a:br>
+              <a:rPr kumimoji="0" lang="de-DE" altLang="de-DE" sz="2000" b="0" i="0" u="none" strike="noStrike" cap="none" normalizeH="0" baseline="0" dirty="0" smtClean="0">
+                <a:ln>
+                  <a:noFill/>
+                </a:ln>
+                <a:solidFill>
+                  <a:srgbClr val="BBBBBB"/>
+                </a:solidFill>
+                <a:effectLst/>
+                <a:latin typeface="JetBrains Mono"/>
+              </a:rPr>
+            </a:br>
+            <a:r>
+              <a:rPr kumimoji="0" lang="de-DE" altLang="de-DE" sz="2000" b="0" i="0" u="none" strike="noStrike" cap="none" normalizeH="0" baseline="0" dirty="0" smtClean="0">
+                <a:ln>
+                  <a:noFill/>
+                </a:ln>
+                <a:solidFill>
+                  <a:srgbClr val="BBBBBB"/>
+                </a:solidFill>
+                <a:effectLst/>
+                <a:latin typeface="JetBrains Mono"/>
+              </a:rPr>
+              <a:t>    </a:t>
+            </a:r>
+            <a:r>
+              <a:rPr kumimoji="0" lang="de-DE" altLang="de-DE" sz="2000" b="0" i="0" u="none" strike="noStrike" cap="none" normalizeH="0" baseline="0" dirty="0" err="1" smtClean="0">
+                <a:ln>
+                  <a:noFill/>
+                </a:ln>
+                <a:solidFill>
+                  <a:srgbClr val="EF596F"/>
+                </a:solidFill>
+                <a:effectLst/>
+                <a:latin typeface="JetBrains Mono"/>
+              </a:rPr>
+              <a:t>docdb_instance_class</a:t>
+            </a:r>
+            <a:r>
+              <a:rPr kumimoji="0" lang="de-DE" altLang="de-DE" sz="2000" b="0" i="0" u="none" strike="noStrike" cap="none" normalizeH="0" baseline="0" dirty="0" smtClean="0">
+                <a:ln>
+                  <a:noFill/>
+                </a:ln>
+                <a:solidFill>
+                  <a:srgbClr val="EF596F"/>
+                </a:solidFill>
+                <a:effectLst/>
+                <a:latin typeface="JetBrains Mono"/>
+              </a:rPr>
+              <a:t> </a:t>
+            </a:r>
+            <a:r>
+              <a:rPr kumimoji="0" lang="de-DE" altLang="de-DE" sz="2000" b="0" i="0" u="none" strike="noStrike" cap="none" normalizeH="0" baseline="0" dirty="0" smtClean="0">
+                <a:ln>
+                  <a:noFill/>
+                </a:ln>
+                <a:solidFill>
+                  <a:srgbClr val="BBBBBB"/>
+                </a:solidFill>
+                <a:effectLst/>
+                <a:latin typeface="JetBrains Mono"/>
+              </a:rPr>
+              <a:t>= </a:t>
+            </a:r>
+            <a:r>
+              <a:rPr kumimoji="0" lang="de-DE" altLang="de-DE" sz="2000" b="0" i="0" u="none" strike="noStrike" cap="none" normalizeH="0" baseline="0" dirty="0" err="1" smtClean="0">
+                <a:ln>
+                  <a:noFill/>
+                </a:ln>
+                <a:solidFill>
+                  <a:srgbClr val="BBBBBB"/>
+                </a:solidFill>
+                <a:effectLst/>
+                <a:latin typeface="JetBrains Mono"/>
+              </a:rPr>
+              <a:t>var.</a:t>
+            </a:r>
+            <a:r>
+              <a:rPr kumimoji="0" lang="de-DE" altLang="de-DE" sz="2000" b="0" i="0" u="none" strike="noStrike" cap="none" normalizeH="0" baseline="0" dirty="0" err="1" smtClean="0">
+                <a:ln>
+                  <a:noFill/>
+                </a:ln>
+                <a:solidFill>
+                  <a:srgbClr val="EF596F"/>
+                </a:solidFill>
+                <a:effectLst/>
+                <a:latin typeface="JetBrains Mono"/>
+              </a:rPr>
+              <a:t>docdb_instance_class</a:t>
+            </a:r>
+            <a:r>
+              <a:rPr kumimoji="0" lang="de-DE" altLang="de-DE" sz="2000" b="0" i="0" u="none" strike="noStrike" cap="none" normalizeH="0" baseline="0" dirty="0" smtClean="0">
+                <a:ln>
+                  <a:noFill/>
+                </a:ln>
+                <a:solidFill>
+                  <a:srgbClr val="BBBBBB"/>
+                </a:solidFill>
+                <a:effectLst/>
+                <a:latin typeface="JetBrains Mono"/>
+              </a:rPr>
+              <a:t>,</a:t>
+            </a:r>
+            <a:br>
+              <a:rPr kumimoji="0" lang="de-DE" altLang="de-DE" sz="2000" b="0" i="0" u="none" strike="noStrike" cap="none" normalizeH="0" baseline="0" dirty="0" smtClean="0">
+                <a:ln>
+                  <a:noFill/>
+                </a:ln>
+                <a:solidFill>
+                  <a:srgbClr val="BBBBBB"/>
+                </a:solidFill>
+                <a:effectLst/>
+                <a:latin typeface="JetBrains Mono"/>
+              </a:rPr>
+            </a:br>
+            <a:r>
+              <a:rPr kumimoji="0" lang="de-DE" altLang="de-DE" sz="2000" b="0" i="0" u="none" strike="noStrike" cap="none" normalizeH="0" baseline="0" dirty="0" smtClean="0">
+                <a:ln>
+                  <a:noFill/>
+                </a:ln>
+                <a:solidFill>
+                  <a:srgbClr val="BBBBBB"/>
+                </a:solidFill>
+                <a:effectLst/>
+                <a:latin typeface="JetBrains Mono"/>
+              </a:rPr>
+              <a:t>    </a:t>
+            </a:r>
+            <a:r>
+              <a:rPr kumimoji="0" lang="de-DE" altLang="de-DE" sz="2000" b="0" i="0" u="none" strike="noStrike" cap="none" normalizeH="0" baseline="0" dirty="0" err="1" smtClean="0">
+                <a:ln>
+                  <a:noFill/>
+                </a:ln>
+                <a:solidFill>
+                  <a:srgbClr val="EF596F"/>
+                </a:solidFill>
+                <a:effectLst/>
+                <a:latin typeface="JetBrains Mono"/>
+              </a:rPr>
+              <a:t>docdb_username</a:t>
+            </a:r>
+            <a:r>
+              <a:rPr kumimoji="0" lang="de-DE" altLang="de-DE" sz="2000" b="0" i="0" u="none" strike="noStrike" cap="none" normalizeH="0" baseline="0" dirty="0" smtClean="0">
+                <a:ln>
+                  <a:noFill/>
+                </a:ln>
+                <a:solidFill>
+                  <a:srgbClr val="EF596F"/>
+                </a:solidFill>
+                <a:effectLst/>
+                <a:latin typeface="JetBrains Mono"/>
+              </a:rPr>
+              <a:t>      </a:t>
+            </a:r>
+            <a:r>
+              <a:rPr kumimoji="0" lang="de-DE" altLang="de-DE" sz="2000" b="0" i="0" u="none" strike="noStrike" cap="none" normalizeH="0" baseline="0" dirty="0" smtClean="0">
+                <a:ln>
+                  <a:noFill/>
+                </a:ln>
+                <a:solidFill>
+                  <a:srgbClr val="BBBBBB"/>
+                </a:solidFill>
+                <a:effectLst/>
+                <a:latin typeface="JetBrains Mono"/>
+              </a:rPr>
+              <a:t>= </a:t>
+            </a:r>
+            <a:r>
+              <a:rPr kumimoji="0" lang="de-DE" altLang="de-DE" sz="2000" b="0" i="0" u="none" strike="noStrike" cap="none" normalizeH="0" baseline="0" dirty="0" err="1" smtClean="0">
+                <a:ln>
+                  <a:noFill/>
+                </a:ln>
+                <a:solidFill>
+                  <a:srgbClr val="BBBBBB"/>
+                </a:solidFill>
+                <a:effectLst/>
+                <a:latin typeface="JetBrains Mono"/>
+              </a:rPr>
+              <a:t>var.</a:t>
+            </a:r>
+            <a:r>
+              <a:rPr kumimoji="0" lang="de-DE" altLang="de-DE" sz="2000" b="0" i="0" u="none" strike="noStrike" cap="none" normalizeH="0" baseline="0" dirty="0" err="1" smtClean="0">
+                <a:ln>
+                  <a:noFill/>
+                </a:ln>
+                <a:solidFill>
+                  <a:srgbClr val="EF596F"/>
+                </a:solidFill>
+                <a:effectLst/>
+                <a:latin typeface="JetBrains Mono"/>
+              </a:rPr>
+              <a:t>docdb_username</a:t>
+            </a:r>
+            <a:r>
+              <a:rPr kumimoji="0" lang="de-DE" altLang="de-DE" sz="2000" b="0" i="0" u="none" strike="noStrike" cap="none" normalizeH="0" baseline="0" dirty="0" smtClean="0">
+                <a:ln>
+                  <a:noFill/>
+                </a:ln>
+                <a:solidFill>
+                  <a:srgbClr val="BBBBBB"/>
+                </a:solidFill>
+                <a:effectLst/>
+                <a:latin typeface="JetBrains Mono"/>
+              </a:rPr>
+              <a:t>,</a:t>
+            </a:r>
+            <a:br>
+              <a:rPr kumimoji="0" lang="de-DE" altLang="de-DE" sz="2000" b="0" i="0" u="none" strike="noStrike" cap="none" normalizeH="0" baseline="0" dirty="0" smtClean="0">
+                <a:ln>
+                  <a:noFill/>
+                </a:ln>
+                <a:solidFill>
+                  <a:srgbClr val="BBBBBB"/>
+                </a:solidFill>
+                <a:effectLst/>
+                <a:latin typeface="JetBrains Mono"/>
+              </a:rPr>
+            </a:br>
+            <a:r>
+              <a:rPr kumimoji="0" lang="de-DE" altLang="de-DE" sz="2000" b="0" i="0" u="none" strike="noStrike" cap="none" normalizeH="0" baseline="0" dirty="0" smtClean="0">
+                <a:ln>
+                  <a:noFill/>
+                </a:ln>
+                <a:solidFill>
+                  <a:srgbClr val="BBBBBB"/>
+                </a:solidFill>
+                <a:effectLst/>
+                <a:latin typeface="JetBrains Mono"/>
+              </a:rPr>
+              <a:t>    </a:t>
+            </a:r>
+            <a:r>
+              <a:rPr kumimoji="0" lang="de-DE" altLang="de-DE" sz="2000" b="0" i="0" u="none" strike="noStrike" cap="none" normalizeH="0" baseline="0" dirty="0" err="1" smtClean="0">
+                <a:ln>
+                  <a:noFill/>
+                </a:ln>
+                <a:solidFill>
+                  <a:srgbClr val="EF596F"/>
+                </a:solidFill>
+                <a:effectLst/>
+                <a:latin typeface="JetBrains Mono"/>
+              </a:rPr>
+              <a:t>docdb_password</a:t>
+            </a:r>
+            <a:r>
+              <a:rPr kumimoji="0" lang="de-DE" altLang="de-DE" sz="2000" b="0" i="0" u="none" strike="noStrike" cap="none" normalizeH="0" baseline="0" dirty="0" smtClean="0">
+                <a:ln>
+                  <a:noFill/>
+                </a:ln>
+                <a:solidFill>
+                  <a:srgbClr val="EF596F"/>
+                </a:solidFill>
+                <a:effectLst/>
+                <a:latin typeface="JetBrains Mono"/>
+              </a:rPr>
+              <a:t>      </a:t>
+            </a:r>
+            <a:r>
+              <a:rPr kumimoji="0" lang="de-DE" altLang="de-DE" sz="2000" b="0" i="0" u="none" strike="noStrike" cap="none" normalizeH="0" baseline="0" dirty="0" smtClean="0">
+                <a:ln>
+                  <a:noFill/>
+                </a:ln>
+                <a:solidFill>
+                  <a:srgbClr val="BBBBBB"/>
+                </a:solidFill>
+                <a:effectLst/>
+                <a:latin typeface="JetBrains Mono"/>
+              </a:rPr>
+              <a:t>= </a:t>
+            </a:r>
+            <a:r>
+              <a:rPr kumimoji="0" lang="de-DE" altLang="de-DE" sz="2000" b="0" i="0" u="none" strike="noStrike" cap="none" normalizeH="0" baseline="0" dirty="0" err="1" smtClean="0">
+                <a:ln>
+                  <a:noFill/>
+                </a:ln>
+                <a:solidFill>
+                  <a:srgbClr val="BBBBBB"/>
+                </a:solidFill>
+                <a:effectLst/>
+                <a:latin typeface="JetBrains Mono"/>
+              </a:rPr>
+              <a:t>var.</a:t>
+            </a:r>
+            <a:r>
+              <a:rPr kumimoji="0" lang="de-DE" altLang="de-DE" sz="2000" b="0" i="0" u="none" strike="noStrike" cap="none" normalizeH="0" baseline="0" dirty="0" err="1" smtClean="0">
+                <a:ln>
+                  <a:noFill/>
+                </a:ln>
+                <a:solidFill>
+                  <a:srgbClr val="EF596F"/>
+                </a:solidFill>
+                <a:effectLst/>
+                <a:latin typeface="JetBrains Mono"/>
+              </a:rPr>
+              <a:t>docdb_password</a:t>
+            </a:r>
+            <a:r>
+              <a:rPr kumimoji="0" lang="de-DE" altLang="de-DE" sz="2000" b="0" i="0" u="none" strike="noStrike" cap="none" normalizeH="0" baseline="0" dirty="0" smtClean="0">
+                <a:ln>
+                  <a:noFill/>
+                </a:ln>
+                <a:solidFill>
+                  <a:srgbClr val="BBBBBB"/>
+                </a:solidFill>
+                <a:effectLst/>
+                <a:latin typeface="JetBrains Mono"/>
+              </a:rPr>
+              <a:t>,</a:t>
+            </a:r>
+            <a:br>
+              <a:rPr kumimoji="0" lang="de-DE" altLang="de-DE" sz="2000" b="0" i="0" u="none" strike="noStrike" cap="none" normalizeH="0" baseline="0" dirty="0" smtClean="0">
+                <a:ln>
+                  <a:noFill/>
+                </a:ln>
+                <a:solidFill>
+                  <a:srgbClr val="BBBBBB"/>
+                </a:solidFill>
+                <a:effectLst/>
+                <a:latin typeface="JetBrains Mono"/>
+              </a:rPr>
+            </a:br>
+            <a:r>
+              <a:rPr kumimoji="0" lang="de-DE" altLang="de-DE" sz="2000" b="0" i="0" u="none" strike="noStrike" cap="none" normalizeH="0" baseline="0" dirty="0" smtClean="0">
+                <a:ln>
+                  <a:noFill/>
+                </a:ln>
+                <a:solidFill>
+                  <a:srgbClr val="BBBBBB"/>
+                </a:solidFill>
+                <a:effectLst/>
+                <a:latin typeface="JetBrains Mono"/>
+              </a:rPr>
+              <a:t>  }</a:t>
+            </a:r>
+            <a:br>
+              <a:rPr kumimoji="0" lang="de-DE" altLang="de-DE" sz="2000" b="0" i="0" u="none" strike="noStrike" cap="none" normalizeH="0" baseline="0" dirty="0" smtClean="0">
+                <a:ln>
+                  <a:noFill/>
+                </a:ln>
+                <a:solidFill>
+                  <a:srgbClr val="BBBBBB"/>
+                </a:solidFill>
+                <a:effectLst/>
+                <a:latin typeface="JetBrains Mono"/>
+              </a:rPr>
+            </a:br>
+            <a:r>
+              <a:rPr kumimoji="0" lang="de-DE" altLang="de-DE" sz="2000" b="0" i="0" u="none" strike="noStrike" cap="none" normalizeH="0" baseline="0" dirty="0" smtClean="0">
+                <a:ln>
+                  <a:noFill/>
+                </a:ln>
+                <a:solidFill>
+                  <a:srgbClr val="BBBBBB"/>
+                </a:solidFill>
+                <a:effectLst/>
+                <a:latin typeface="JetBrains Mono"/>
+              </a:rPr>
+              <a:t>  </a:t>
+            </a:r>
+            <a:r>
+              <a:rPr kumimoji="0" lang="de-DE" altLang="de-DE" sz="2000" b="0" i="0" u="none" strike="noStrike" cap="none" normalizeH="0" baseline="0" dirty="0" err="1" smtClean="0">
+                <a:ln>
+                  <a:noFill/>
+                </a:ln>
+                <a:solidFill>
+                  <a:srgbClr val="EF596F"/>
+                </a:solidFill>
+                <a:effectLst/>
+                <a:latin typeface="JetBrains Mono"/>
+              </a:rPr>
+              <a:t>private_subnets</a:t>
+            </a:r>
+            <a:r>
+              <a:rPr kumimoji="0" lang="de-DE" altLang="de-DE" sz="2000" b="0" i="0" u="none" strike="noStrike" cap="none" normalizeH="0" baseline="0" dirty="0" smtClean="0">
+                <a:ln>
+                  <a:noFill/>
+                </a:ln>
+                <a:solidFill>
+                  <a:srgbClr val="EF596F"/>
+                </a:solidFill>
+                <a:effectLst/>
+                <a:latin typeface="JetBrains Mono"/>
+              </a:rPr>
+              <a:t> </a:t>
+            </a:r>
+            <a:r>
+              <a:rPr kumimoji="0" lang="de-DE" altLang="de-DE" sz="2000" b="0" i="0" u="none" strike="noStrike" cap="none" normalizeH="0" baseline="0" dirty="0" smtClean="0">
+                <a:ln>
+                  <a:noFill/>
+                </a:ln>
+                <a:solidFill>
+                  <a:srgbClr val="BBBBBB"/>
+                </a:solidFill>
+                <a:effectLst/>
+                <a:latin typeface="JetBrains Mono"/>
+              </a:rPr>
+              <a:t>= module.</a:t>
+            </a:r>
+            <a:r>
+              <a:rPr kumimoji="0" lang="de-DE" altLang="de-DE" sz="2000" b="0" i="0" u="none" strike="noStrike" cap="none" normalizeH="0" baseline="0" dirty="0" smtClean="0">
+                <a:ln>
+                  <a:noFill/>
+                </a:ln>
+                <a:solidFill>
+                  <a:srgbClr val="EF596F"/>
+                </a:solidFill>
+                <a:effectLst/>
+                <a:latin typeface="JetBrains Mono"/>
+              </a:rPr>
+              <a:t>subnets4docdb</a:t>
+            </a:r>
+            <a:r>
+              <a:rPr kumimoji="0" lang="de-DE" altLang="de-DE" sz="2000" b="0" i="0" u="none" strike="noStrike" cap="none" normalizeH="0" baseline="0" dirty="0" smtClean="0">
+                <a:ln>
+                  <a:noFill/>
+                </a:ln>
+                <a:solidFill>
+                  <a:srgbClr val="BBBBBB"/>
+                </a:solidFill>
+                <a:effectLst/>
+                <a:latin typeface="JetBrains Mono"/>
+              </a:rPr>
+              <a:t>.</a:t>
+            </a:r>
+            <a:r>
+              <a:rPr kumimoji="0" lang="de-DE" altLang="de-DE" sz="2000" b="0" i="0" u="none" strike="noStrike" cap="none" normalizeH="0" baseline="0" dirty="0" smtClean="0">
+                <a:ln>
+                  <a:noFill/>
+                </a:ln>
+                <a:solidFill>
+                  <a:srgbClr val="EF596F"/>
+                </a:solidFill>
+                <a:effectLst/>
+                <a:latin typeface="JetBrains Mono"/>
+              </a:rPr>
+              <a:t>private_subnet_ids</a:t>
+            </a:r>
+            <a:br>
+              <a:rPr kumimoji="0" lang="de-DE" altLang="de-DE" sz="2000" b="0" i="0" u="none" strike="noStrike" cap="none" normalizeH="0" baseline="0" dirty="0" smtClean="0">
+                <a:ln>
+                  <a:noFill/>
+                </a:ln>
+                <a:solidFill>
+                  <a:srgbClr val="EF596F"/>
+                </a:solidFill>
+                <a:effectLst/>
+                <a:latin typeface="JetBrains Mono"/>
+              </a:rPr>
+            </a:br>
+            <a:r>
+              <a:rPr kumimoji="0" lang="de-DE" altLang="de-DE" sz="2000" b="0" i="0" u="none" strike="noStrike" cap="none" normalizeH="0" baseline="0" dirty="0" smtClean="0">
+                <a:ln>
+                  <a:noFill/>
+                </a:ln>
+                <a:solidFill>
+                  <a:srgbClr val="EF596F"/>
+                </a:solidFill>
+                <a:effectLst/>
+                <a:latin typeface="JetBrains Mono"/>
+              </a:rPr>
+              <a:t>  </a:t>
+            </a:r>
+            <a:r>
+              <a:rPr kumimoji="0" lang="de-DE" altLang="de-DE" sz="2000" b="0" i="0" u="none" strike="noStrike" cap="none" normalizeH="0" baseline="0" dirty="0" err="1" smtClean="0">
+                <a:ln>
+                  <a:noFill/>
+                </a:ln>
+                <a:solidFill>
+                  <a:srgbClr val="EF596F"/>
+                </a:solidFill>
+                <a:effectLst/>
+                <a:latin typeface="JetBrains Mono"/>
+              </a:rPr>
+              <a:t>vpc_id</a:t>
+            </a:r>
+            <a:r>
+              <a:rPr kumimoji="0" lang="de-DE" altLang="de-DE" sz="2000" b="0" i="0" u="none" strike="noStrike" cap="none" normalizeH="0" baseline="0" dirty="0" smtClean="0">
+                <a:ln>
+                  <a:noFill/>
+                </a:ln>
+                <a:solidFill>
+                  <a:srgbClr val="EF596F"/>
+                </a:solidFill>
+                <a:effectLst/>
+                <a:latin typeface="JetBrains Mono"/>
+              </a:rPr>
+              <a:t> </a:t>
+            </a:r>
+            <a:r>
+              <a:rPr kumimoji="0" lang="de-DE" altLang="de-DE" sz="2000" b="0" i="0" u="none" strike="noStrike" cap="none" normalizeH="0" baseline="0" dirty="0" smtClean="0">
+                <a:ln>
+                  <a:noFill/>
+                </a:ln>
+                <a:solidFill>
+                  <a:srgbClr val="BBBBBB"/>
+                </a:solidFill>
+                <a:effectLst/>
+                <a:latin typeface="JetBrains Mono"/>
+              </a:rPr>
+              <a:t>= </a:t>
+            </a:r>
+            <a:r>
+              <a:rPr kumimoji="0" lang="de-DE" altLang="de-DE" sz="2000" b="0" i="0" u="none" strike="noStrike" cap="none" normalizeH="0" baseline="0" dirty="0" err="1" smtClean="0">
+                <a:ln>
+                  <a:noFill/>
+                </a:ln>
+                <a:solidFill>
+                  <a:srgbClr val="BBBBBB"/>
+                </a:solidFill>
+                <a:effectLst/>
+                <a:latin typeface="JetBrains Mono"/>
+              </a:rPr>
+              <a:t>module.</a:t>
+            </a:r>
+            <a:r>
+              <a:rPr kumimoji="0" lang="de-DE" altLang="de-DE" sz="2000" b="0" i="0" u="none" strike="noStrike" cap="none" normalizeH="0" baseline="0" dirty="0" err="1" smtClean="0">
+                <a:ln>
+                  <a:noFill/>
+                </a:ln>
+                <a:solidFill>
+                  <a:srgbClr val="EF596F"/>
+                </a:solidFill>
+                <a:effectLst/>
+                <a:latin typeface="JetBrains Mono"/>
+              </a:rPr>
+              <a:t>commonVpc</a:t>
+            </a:r>
+            <a:r>
+              <a:rPr kumimoji="0" lang="de-DE" altLang="de-DE" sz="2000" b="0" i="0" u="none" strike="noStrike" cap="none" normalizeH="0" baseline="0" dirty="0" err="1" smtClean="0">
+                <a:ln>
+                  <a:noFill/>
+                </a:ln>
+                <a:solidFill>
+                  <a:srgbClr val="BBBBBB"/>
+                </a:solidFill>
+                <a:effectLst/>
+                <a:latin typeface="JetBrains Mono"/>
+              </a:rPr>
+              <a:t>.</a:t>
+            </a:r>
+            <a:r>
+              <a:rPr kumimoji="0" lang="de-DE" altLang="de-DE" sz="2000" b="0" i="0" u="none" strike="noStrike" cap="none" normalizeH="0" baseline="0" dirty="0" err="1" smtClean="0">
+                <a:ln>
+                  <a:noFill/>
+                </a:ln>
+                <a:solidFill>
+                  <a:srgbClr val="EF596F"/>
+                </a:solidFill>
+                <a:effectLst/>
+                <a:latin typeface="JetBrains Mono"/>
+              </a:rPr>
+              <a:t>vpc_id</a:t>
+            </a:r>
+            <a:r>
+              <a:rPr kumimoji="0" lang="de-DE" altLang="de-DE" sz="2000" b="0" i="0" u="none" strike="noStrike" cap="none" normalizeH="0" baseline="0" dirty="0" smtClean="0">
+                <a:ln>
+                  <a:noFill/>
+                </a:ln>
+                <a:solidFill>
+                  <a:srgbClr val="EF596F"/>
+                </a:solidFill>
+                <a:effectLst/>
+                <a:latin typeface="JetBrains Mono"/>
+              </a:rPr>
+              <a:t/>
+            </a:r>
+            <a:br>
+              <a:rPr kumimoji="0" lang="de-DE" altLang="de-DE" sz="2000" b="0" i="0" u="none" strike="noStrike" cap="none" normalizeH="0" baseline="0" dirty="0" smtClean="0">
+                <a:ln>
+                  <a:noFill/>
+                </a:ln>
+                <a:solidFill>
+                  <a:srgbClr val="EF596F"/>
+                </a:solidFill>
+                <a:effectLst/>
+                <a:latin typeface="JetBrains Mono"/>
+              </a:rPr>
+            </a:br>
+            <a:r>
+              <a:rPr kumimoji="0" lang="de-DE" altLang="de-DE" sz="2000" b="0" i="0" u="none" strike="noStrike" cap="none" normalizeH="0" baseline="0" dirty="0" smtClean="0">
+                <a:ln>
+                  <a:noFill/>
+                </a:ln>
+                <a:solidFill>
+                  <a:srgbClr val="EF596F"/>
+                </a:solidFill>
+                <a:effectLst/>
+                <a:latin typeface="JetBrains Mono"/>
+              </a:rPr>
+              <a:t>  </a:t>
+            </a:r>
+            <a:r>
+              <a:rPr kumimoji="0" lang="de-DE" altLang="de-DE" sz="2000" b="0" i="0" u="none" strike="noStrike" cap="none" normalizeH="0" baseline="0" dirty="0" err="1" smtClean="0">
+                <a:ln>
+                  <a:noFill/>
+                </a:ln>
+                <a:solidFill>
+                  <a:srgbClr val="EF596F"/>
+                </a:solidFill>
+                <a:effectLst/>
+                <a:latin typeface="JetBrains Mono"/>
+              </a:rPr>
+              <a:t>ipNet</a:t>
+            </a:r>
+            <a:r>
+              <a:rPr kumimoji="0" lang="de-DE" altLang="de-DE" sz="2000" b="0" i="0" u="none" strike="noStrike" cap="none" normalizeH="0" baseline="0" dirty="0" smtClean="0">
+                <a:ln>
+                  <a:noFill/>
+                </a:ln>
+                <a:solidFill>
+                  <a:srgbClr val="EF596F"/>
+                </a:solidFill>
+                <a:effectLst/>
+                <a:latin typeface="JetBrains Mono"/>
+              </a:rPr>
+              <a:t> </a:t>
+            </a:r>
+            <a:r>
+              <a:rPr kumimoji="0" lang="de-DE" altLang="de-DE" sz="2000" b="0" i="0" u="none" strike="noStrike" cap="none" normalizeH="0" baseline="0" dirty="0" smtClean="0">
+                <a:ln>
+                  <a:noFill/>
+                </a:ln>
+                <a:solidFill>
+                  <a:srgbClr val="BBBBBB"/>
+                </a:solidFill>
+                <a:effectLst/>
+                <a:latin typeface="JetBrains Mono"/>
+              </a:rPr>
+              <a:t>= </a:t>
+            </a:r>
+            <a:r>
+              <a:rPr kumimoji="0" lang="de-DE" altLang="de-DE" sz="2000" b="0" i="0" u="none" strike="noStrike" cap="none" normalizeH="0" baseline="0" dirty="0" err="1" smtClean="0">
+                <a:ln>
+                  <a:noFill/>
+                </a:ln>
+                <a:solidFill>
+                  <a:srgbClr val="BBBBBB"/>
+                </a:solidFill>
+                <a:effectLst/>
+                <a:latin typeface="JetBrains Mono"/>
+              </a:rPr>
+              <a:t>var.</a:t>
+            </a:r>
+            <a:r>
+              <a:rPr kumimoji="0" lang="de-DE" altLang="de-DE" sz="2000" b="0" i="0" u="none" strike="noStrike" cap="none" normalizeH="0" baseline="0" dirty="0" err="1" smtClean="0">
+                <a:ln>
+                  <a:noFill/>
+                </a:ln>
+                <a:solidFill>
+                  <a:srgbClr val="EF596F"/>
+                </a:solidFill>
+                <a:effectLst/>
+                <a:latin typeface="JetBrains Mono"/>
+              </a:rPr>
+              <a:t>ipNet</a:t>
+            </a:r>
+            <a:r>
+              <a:rPr kumimoji="0" lang="de-DE" altLang="de-DE" sz="2000" b="0" i="0" u="none" strike="noStrike" cap="none" normalizeH="0" baseline="0" dirty="0" smtClean="0">
+                <a:ln>
+                  <a:noFill/>
+                </a:ln>
+                <a:solidFill>
+                  <a:srgbClr val="EF596F"/>
+                </a:solidFill>
+                <a:effectLst/>
+                <a:latin typeface="JetBrains Mono"/>
+              </a:rPr>
+              <a:t/>
+            </a:r>
+            <a:br>
+              <a:rPr kumimoji="0" lang="de-DE" altLang="de-DE" sz="2000" b="0" i="0" u="none" strike="noStrike" cap="none" normalizeH="0" baseline="0" dirty="0" smtClean="0">
+                <a:ln>
+                  <a:noFill/>
+                </a:ln>
+                <a:solidFill>
+                  <a:srgbClr val="EF596F"/>
+                </a:solidFill>
+                <a:effectLst/>
+                <a:latin typeface="JetBrains Mono"/>
+              </a:rPr>
+            </a:br>
+            <a:r>
+              <a:rPr kumimoji="0" lang="de-DE" altLang="de-DE" sz="2000" b="0" i="0" u="none" strike="noStrike" cap="none" normalizeH="0" baseline="0" dirty="0" smtClean="0">
+                <a:ln>
+                  <a:noFill/>
+                </a:ln>
+                <a:solidFill>
+                  <a:srgbClr val="BBBBBB"/>
+                </a:solidFill>
+                <a:effectLst/>
+                <a:latin typeface="JetBrains Mono"/>
+              </a:rPr>
+              <a:t>}</a:t>
+            </a:r>
+            <a:endParaRPr kumimoji="0" lang="de-DE" altLang="de-DE" sz="4400" b="0" i="0" u="none" strike="noStrike" cap="none" normalizeH="0" baseline="0" dirty="0" smtClean="0">
+              <a:ln>
+                <a:noFill/>
+              </a:ln>
+              <a:solidFill>
+                <a:schemeClr val="tx1"/>
+              </a:solidFill>
+              <a:effectLst/>
+              <a:latin typeface="Arial" panose="020B0604020202020204" pitchFamily="34" charset="0"/>
+            </a:endParaRPr>
+          </a:p>
+        </p:txBody>
+      </p:sp>
+    </p:spTree>
+    <p:extLst>
+      <p:ext uri="{BB962C8B-B14F-4D97-AF65-F5344CB8AC3E}">
+        <p14:creationId xmlns:p14="http://schemas.microsoft.com/office/powerpoint/2010/main" val="3569864209"/>
+      </p:ext>
+    </p:extLst>
+  </p:cSld>
+  <p:clrMapOvr>
+    <a:masterClrMapping/>
+  </p:clrMapOvr>
+  <p:timing>
+    <p:tnLst>
+      <p:par>
+        <p:cTn id="1" dur="indefinite" restart="never" nodeType="tmRoot"/>
+      </p:par>
+    </p:tnLst>
+  </p:timing>
+</p:sld>
+</file>
+
+<file path=ppt/slides/slide3.xml><?xml version="1.0" encoding="utf-8"?>
+<p:sld xmlns:a="http://schemas.openxmlformats.org/drawingml/2006/main" xmlns:r="http://schemas.openxmlformats.org/officeDocument/2006/relationships" xmlns:p="http://schemas.openxmlformats.org/presentationml/2006/main">
+  <p:cSld>
+    <p:spTree>
+      <p:nvGrpSpPr>
+        <p:cNvPr id="1" name=""/>
+        <p:cNvGrpSpPr/>
+        <p:nvPr/>
+      </p:nvGrpSpPr>
+      <p:grpSpPr>
+        <a:xfrm>
+          <a:off x="0" y="0"/>
+          <a:ext cx="0" cy="0"/>
+          <a:chOff x="0" y="0"/>
+          <a:chExt cx="0" cy="0"/>
+        </a:xfrm>
+      </p:grpSpPr>
+      <p:sp>
+        <p:nvSpPr>
+          <p:cNvPr id="2" name="Titel 1"/>
+          <p:cNvSpPr>
+            <a:spLocks noGrp="1"/>
+          </p:cNvSpPr>
+          <p:nvPr>
+            <p:ph type="title"/>
+          </p:nvPr>
+        </p:nvSpPr>
+        <p:spPr/>
+        <p:txBody>
+          <a:bodyPr/>
+          <a:lstStyle/>
+          <a:p>
+            <a:r>
+              <a:rPr lang="de-DE" dirty="0" smtClean="0"/>
+              <a:t>Module Registry</a:t>
+            </a:r>
+            <a:endParaRPr lang="de-DE" dirty="0"/>
+          </a:p>
+        </p:txBody>
+      </p:sp>
+      <p:sp>
+        <p:nvSpPr>
+          <p:cNvPr id="3" name="Inhaltsplatzhalter 2"/>
+          <p:cNvSpPr>
+            <a:spLocks noGrp="1"/>
+          </p:cNvSpPr>
+          <p:nvPr>
+            <p:ph idx="1"/>
+          </p:nvPr>
+        </p:nvSpPr>
+        <p:spPr>
+          <a:xfrm>
+            <a:off x="838200" y="1825625"/>
+            <a:ext cx="10515600" cy="4351338"/>
+          </a:xfrm>
+        </p:spPr>
+        <p:txBody>
+          <a:bodyPr/>
+          <a:lstStyle/>
+          <a:p>
+            <a:r>
+              <a:rPr lang="de-DE" dirty="0" smtClean="0"/>
+              <a:t>Aktuell &gt;7300 Module</a:t>
+            </a:r>
+          </a:p>
+          <a:p>
+            <a:pPr lvl="1"/>
+            <a:r>
+              <a:rPr lang="de-DE" dirty="0" smtClean="0">
+                <a:hlinkClick r:id="rId3"/>
+              </a:rPr>
+              <a:t>https</a:t>
+            </a:r>
+            <a:r>
+              <a:rPr lang="de-DE" dirty="0">
+                <a:hlinkClick r:id="rId3"/>
+              </a:rPr>
+              <a:t>://</a:t>
+            </a:r>
+            <a:r>
+              <a:rPr lang="de-DE" dirty="0" smtClean="0">
+                <a:hlinkClick r:id="rId3"/>
+              </a:rPr>
+              <a:t>registry.terraform.io/browse/modules</a:t>
+            </a:r>
+            <a:endParaRPr lang="de-DE" dirty="0" smtClean="0"/>
+          </a:p>
+        </p:txBody>
+      </p:sp>
+      <p:sp>
+        <p:nvSpPr>
+          <p:cNvPr id="4" name="Rectangle 1"/>
+          <p:cNvSpPr>
+            <a:spLocks noChangeArrowheads="1"/>
+          </p:cNvSpPr>
+          <p:nvPr/>
+        </p:nvSpPr>
+        <p:spPr bwMode="auto">
+          <a:xfrm>
+            <a:off x="198439" y="2873512"/>
+            <a:ext cx="5910592" cy="3170099"/>
+          </a:xfrm>
+          <a:prstGeom prst="rect">
+            <a:avLst/>
+          </a:prstGeom>
+          <a:solidFill>
+            <a:srgbClr val="282C34"/>
+          </a:solidFill>
+          <a:ln>
+            <a:noFill/>
+          </a:ln>
+          <a:effectLst/>
+          <a:extLst>
+            <a:ext uri="{91240B29-F687-4F45-9708-019B960494DF}">
+              <a14:hiddenLine xmlns:a14="http://schemas.microsoft.com/office/drawing/2010/main" w="9525">
+                <a:solidFill>
+                  <a:schemeClr val="tx1"/>
+                </a:solidFill>
+                <a:miter lim="800000"/>
+                <a:headEnd/>
+                <a:tailEnd/>
+              </a14:hiddenLine>
+            </a:ext>
+            <a:ext uri="{AF507438-7753-43E0-B8FC-AC1667EBCBE1}">
+              <a14:hiddenEffects xmlns:a14="http://schemas.microsoft.com/office/drawing/2010/main">
+                <a:effectLst>
+                  <a:outerShdw dist="35921" dir="2700000" algn="ctr" rotWithShape="0">
+                    <a:schemeClr val="bg2"/>
+                  </a:outerShdw>
+                </a:effectLst>
+              </a14:hiddenEffects>
+            </a:ext>
+          </a:extLst>
+        </p:spPr>
+        <p:txBody>
+          <a:bodyPr vert="horz" wrap="none" lIns="91440" tIns="45720" rIns="91440" bIns="45720" numCol="1" anchor="ctr" anchorCtr="0" compatLnSpc="1">
+            <a:prstTxWarp prst="textNoShape">
+              <a:avLst/>
+            </a:prstTxWarp>
+            <a:spAutoFit/>
+          </a:bodyPr>
+          <a:lstStyle/>
+          <a:p>
+            <a:pPr marL="0" marR="0" lvl="0" indent="0" algn="l" defTabSz="914400" rtl="0" eaLnBrk="0" fontAlgn="base" latinLnBrk="0" hangingPunct="0">
+              <a:lnSpc>
+                <a:spcPct val="100000"/>
+              </a:lnSpc>
+              <a:spcBef>
+                <a:spcPct val="0"/>
+              </a:spcBef>
+              <a:spcAft>
+                <a:spcPct val="0"/>
+              </a:spcAft>
+              <a:buClrTx/>
+              <a:buSzTx/>
+              <a:buFontTx/>
+              <a:buNone/>
+              <a:tabLst/>
+            </a:pPr>
+            <a:r>
+              <a:rPr kumimoji="0" lang="de-DE" altLang="de-DE" sz="2000" b="0" i="1" u="none" strike="noStrike" cap="none" normalizeH="0" baseline="0" dirty="0" err="1" smtClean="0">
+                <a:ln>
+                  <a:noFill/>
+                </a:ln>
+                <a:solidFill>
+                  <a:srgbClr val="D55FDE"/>
+                </a:solidFill>
+                <a:effectLst/>
+                <a:latin typeface="JetBrains Mono"/>
+              </a:rPr>
+              <a:t>module</a:t>
+            </a:r>
+            <a:r>
+              <a:rPr kumimoji="0" lang="de-DE" altLang="de-DE" sz="2000" b="0" i="1" u="none" strike="noStrike" cap="none" normalizeH="0" baseline="0" dirty="0" smtClean="0">
+                <a:ln>
+                  <a:noFill/>
+                </a:ln>
+                <a:solidFill>
+                  <a:srgbClr val="D55FDE"/>
+                </a:solidFill>
+                <a:effectLst/>
+                <a:latin typeface="JetBrains Mono"/>
+              </a:rPr>
+              <a:t> </a:t>
+            </a:r>
+            <a:r>
+              <a:rPr kumimoji="0" lang="de-DE" altLang="de-DE" sz="2000" b="0" i="0" u="none" strike="noStrike" cap="none" normalizeH="0" baseline="0" dirty="0" smtClean="0">
+                <a:ln>
+                  <a:noFill/>
+                </a:ln>
+                <a:solidFill>
+                  <a:srgbClr val="E5C07B"/>
+                </a:solidFill>
+                <a:effectLst/>
+                <a:latin typeface="JetBrains Mono"/>
+              </a:rPr>
+              <a:t>"s3_bucket" </a:t>
+            </a:r>
+            <a:r>
+              <a:rPr kumimoji="0" lang="de-DE" altLang="de-DE" sz="2000" b="0" i="0" u="none" strike="noStrike" cap="none" normalizeH="0" baseline="0" dirty="0" smtClean="0">
+                <a:ln>
+                  <a:noFill/>
+                </a:ln>
+                <a:solidFill>
+                  <a:srgbClr val="BBBBBB"/>
+                </a:solidFill>
+                <a:effectLst/>
+                <a:latin typeface="JetBrains Mono"/>
+              </a:rPr>
+              <a:t>{</a:t>
+            </a:r>
+            <a:br>
+              <a:rPr kumimoji="0" lang="de-DE" altLang="de-DE" sz="2000" b="0" i="0" u="none" strike="noStrike" cap="none" normalizeH="0" baseline="0" dirty="0" smtClean="0">
+                <a:ln>
+                  <a:noFill/>
+                </a:ln>
+                <a:solidFill>
+                  <a:srgbClr val="BBBBBB"/>
+                </a:solidFill>
+                <a:effectLst/>
+                <a:latin typeface="JetBrains Mono"/>
+              </a:rPr>
+            </a:br>
+            <a:r>
+              <a:rPr kumimoji="0" lang="de-DE" altLang="de-DE" sz="2000" b="0" i="0" u="none" strike="noStrike" cap="none" normalizeH="0" baseline="0" dirty="0" smtClean="0">
+                <a:ln>
+                  <a:noFill/>
+                </a:ln>
+                <a:solidFill>
+                  <a:srgbClr val="BBBBBB"/>
+                </a:solidFill>
+                <a:effectLst/>
+                <a:latin typeface="JetBrains Mono"/>
+              </a:rPr>
+              <a:t>  </a:t>
+            </a:r>
+            <a:r>
+              <a:rPr kumimoji="0" lang="de-DE" altLang="de-DE" sz="2000" b="0" i="0" u="none" strike="noStrike" cap="none" normalizeH="0" baseline="0" dirty="0" err="1" smtClean="0">
+                <a:ln>
+                  <a:noFill/>
+                </a:ln>
+                <a:solidFill>
+                  <a:srgbClr val="EF596F"/>
+                </a:solidFill>
+                <a:effectLst/>
+                <a:latin typeface="JetBrains Mono"/>
+              </a:rPr>
+              <a:t>source</a:t>
+            </a:r>
+            <a:r>
+              <a:rPr kumimoji="0" lang="de-DE" altLang="de-DE" sz="2000" b="0" i="0" u="none" strike="noStrike" cap="none" normalizeH="0" baseline="0" dirty="0" smtClean="0">
+                <a:ln>
+                  <a:noFill/>
+                </a:ln>
+                <a:solidFill>
+                  <a:srgbClr val="EF596F"/>
+                </a:solidFill>
+                <a:effectLst/>
+                <a:latin typeface="JetBrains Mono"/>
+              </a:rPr>
+              <a:t> </a:t>
+            </a:r>
+            <a:r>
+              <a:rPr kumimoji="0" lang="de-DE" altLang="de-DE" sz="2000" b="0" i="0" u="none" strike="noStrike" cap="none" normalizeH="0" baseline="0" dirty="0" smtClean="0">
+                <a:ln>
+                  <a:noFill/>
+                </a:ln>
+                <a:solidFill>
+                  <a:srgbClr val="BBBBBB"/>
+                </a:solidFill>
+                <a:effectLst/>
+                <a:latin typeface="JetBrains Mono"/>
+              </a:rPr>
+              <a:t>= </a:t>
+            </a:r>
+            <a:r>
+              <a:rPr kumimoji="0" lang="de-DE" altLang="de-DE" sz="2000" b="0" i="0" u="none" strike="noStrike" cap="none" normalizeH="0" baseline="0" dirty="0" smtClean="0">
+                <a:ln>
+                  <a:noFill/>
+                </a:ln>
+                <a:solidFill>
+                  <a:srgbClr val="89CA78"/>
+                </a:solidFill>
+                <a:effectLst/>
+                <a:latin typeface="JetBrains Mono"/>
+              </a:rPr>
+              <a:t>"</a:t>
+            </a:r>
+            <a:r>
+              <a:rPr kumimoji="0" lang="de-DE" altLang="de-DE" sz="2000" b="0" i="0" u="none" strike="noStrike" cap="none" normalizeH="0" baseline="0" dirty="0" err="1" smtClean="0">
+                <a:ln>
+                  <a:noFill/>
+                </a:ln>
+                <a:solidFill>
+                  <a:srgbClr val="89CA78"/>
+                </a:solidFill>
+                <a:effectLst/>
+                <a:latin typeface="JetBrains Mono"/>
+              </a:rPr>
+              <a:t>terraform</a:t>
+            </a:r>
+            <a:r>
+              <a:rPr kumimoji="0" lang="de-DE" altLang="de-DE" sz="2000" b="0" i="0" u="none" strike="noStrike" cap="none" normalizeH="0" baseline="0" dirty="0" smtClean="0">
+                <a:ln>
+                  <a:noFill/>
+                </a:ln>
+                <a:solidFill>
+                  <a:srgbClr val="89CA78"/>
+                </a:solidFill>
+                <a:effectLst/>
+                <a:latin typeface="JetBrains Mono"/>
+              </a:rPr>
+              <a:t>-</a:t>
+            </a:r>
+            <a:r>
+              <a:rPr kumimoji="0" lang="de-DE" altLang="de-DE" sz="2000" b="0" i="0" u="none" strike="noStrike" cap="none" normalizeH="0" baseline="0" dirty="0" err="1" smtClean="0">
+                <a:ln>
+                  <a:noFill/>
+                </a:ln>
+                <a:solidFill>
+                  <a:srgbClr val="89CA78"/>
+                </a:solidFill>
+                <a:effectLst/>
+                <a:latin typeface="JetBrains Mono"/>
+              </a:rPr>
+              <a:t>aws</a:t>
+            </a:r>
+            <a:r>
+              <a:rPr kumimoji="0" lang="de-DE" altLang="de-DE" sz="2000" b="0" i="0" u="none" strike="noStrike" cap="none" normalizeH="0" baseline="0" dirty="0" smtClean="0">
+                <a:ln>
+                  <a:noFill/>
+                </a:ln>
+                <a:solidFill>
+                  <a:srgbClr val="89CA78"/>
+                </a:solidFill>
+                <a:effectLst/>
+                <a:latin typeface="JetBrains Mono"/>
+              </a:rPr>
+              <a:t>-modules/s3-bucket/</a:t>
+            </a:r>
+            <a:r>
+              <a:rPr kumimoji="0" lang="de-DE" altLang="de-DE" sz="2000" b="0" i="0" u="none" strike="noStrike" cap="none" normalizeH="0" baseline="0" dirty="0" err="1" smtClean="0">
+                <a:ln>
+                  <a:noFill/>
+                </a:ln>
+                <a:solidFill>
+                  <a:srgbClr val="89CA78"/>
+                </a:solidFill>
+                <a:effectLst/>
+                <a:latin typeface="JetBrains Mono"/>
+              </a:rPr>
+              <a:t>aws</a:t>
+            </a:r>
+            <a:r>
+              <a:rPr kumimoji="0" lang="de-DE" altLang="de-DE" sz="2000" b="0" i="0" u="none" strike="noStrike" cap="none" normalizeH="0" baseline="0" dirty="0" smtClean="0">
+                <a:ln>
+                  <a:noFill/>
+                </a:ln>
+                <a:solidFill>
+                  <a:srgbClr val="89CA78"/>
+                </a:solidFill>
+                <a:effectLst/>
+                <a:latin typeface="JetBrains Mono"/>
+              </a:rPr>
+              <a:t>"</a:t>
+            </a:r>
+            <a:br>
+              <a:rPr kumimoji="0" lang="de-DE" altLang="de-DE" sz="2000" b="0" i="0" u="none" strike="noStrike" cap="none" normalizeH="0" baseline="0" dirty="0" smtClean="0">
+                <a:ln>
+                  <a:noFill/>
+                </a:ln>
+                <a:solidFill>
+                  <a:srgbClr val="89CA78"/>
+                </a:solidFill>
+                <a:effectLst/>
+                <a:latin typeface="JetBrains Mono"/>
+              </a:rPr>
+            </a:br>
+            <a:r>
+              <a:rPr kumimoji="0" lang="de-DE" altLang="de-DE" sz="2000" b="0" i="0" u="none" strike="noStrike" cap="none" normalizeH="0" baseline="0" dirty="0" smtClean="0">
+                <a:ln>
+                  <a:noFill/>
+                </a:ln>
+                <a:solidFill>
+                  <a:srgbClr val="89CA78"/>
+                </a:solidFill>
+                <a:effectLst/>
+                <a:latin typeface="JetBrains Mono"/>
+              </a:rPr>
+              <a:t>  </a:t>
+            </a:r>
+            <a:r>
+              <a:rPr kumimoji="0" lang="de-DE" altLang="de-DE" sz="2000" b="0" i="0" u="none" strike="noStrike" cap="none" normalizeH="0" baseline="0" dirty="0" err="1" smtClean="0">
+                <a:ln>
+                  <a:noFill/>
+                </a:ln>
+                <a:solidFill>
+                  <a:srgbClr val="EF596F"/>
+                </a:solidFill>
+                <a:effectLst/>
+                <a:latin typeface="JetBrains Mono"/>
+              </a:rPr>
+              <a:t>version</a:t>
+            </a:r>
+            <a:r>
+              <a:rPr kumimoji="0" lang="de-DE" altLang="de-DE" sz="2000" b="0" i="0" u="none" strike="noStrike" cap="none" normalizeH="0" baseline="0" dirty="0" smtClean="0">
+                <a:ln>
+                  <a:noFill/>
+                </a:ln>
+                <a:solidFill>
+                  <a:srgbClr val="EF596F"/>
+                </a:solidFill>
+                <a:effectLst/>
+                <a:latin typeface="JetBrains Mono"/>
+              </a:rPr>
+              <a:t> </a:t>
+            </a:r>
+            <a:r>
+              <a:rPr kumimoji="0" lang="de-DE" altLang="de-DE" sz="2000" b="0" i="0" u="none" strike="noStrike" cap="none" normalizeH="0" baseline="0" dirty="0" smtClean="0">
+                <a:ln>
+                  <a:noFill/>
+                </a:ln>
+                <a:solidFill>
+                  <a:srgbClr val="BBBBBB"/>
+                </a:solidFill>
+                <a:effectLst/>
+                <a:latin typeface="JetBrains Mono"/>
+              </a:rPr>
+              <a:t>= </a:t>
+            </a:r>
+            <a:r>
+              <a:rPr kumimoji="0" lang="de-DE" altLang="de-DE" sz="2000" b="0" i="0" u="none" strike="noStrike" cap="none" normalizeH="0" baseline="0" dirty="0" smtClean="0">
+                <a:ln>
+                  <a:noFill/>
+                </a:ln>
+                <a:solidFill>
+                  <a:srgbClr val="89CA78"/>
+                </a:solidFill>
+                <a:effectLst/>
+                <a:latin typeface="JetBrains Mono"/>
+              </a:rPr>
+              <a:t>"~&gt; 2.11.1"</a:t>
+            </a:r>
+            <a:br>
+              <a:rPr kumimoji="0" lang="de-DE" altLang="de-DE" sz="2000" b="0" i="0" u="none" strike="noStrike" cap="none" normalizeH="0" baseline="0" dirty="0" smtClean="0">
+                <a:ln>
+                  <a:noFill/>
+                </a:ln>
+                <a:solidFill>
+                  <a:srgbClr val="89CA78"/>
+                </a:solidFill>
+                <a:effectLst/>
+                <a:latin typeface="JetBrains Mono"/>
+              </a:rPr>
+            </a:br>
+            <a:r>
+              <a:rPr kumimoji="0" lang="de-DE" altLang="de-DE" sz="2000" b="0" i="0" u="none" strike="noStrike" cap="none" normalizeH="0" baseline="0" dirty="0" smtClean="0">
+                <a:ln>
+                  <a:noFill/>
+                </a:ln>
+                <a:solidFill>
+                  <a:srgbClr val="89CA78"/>
+                </a:solidFill>
+                <a:effectLst/>
+                <a:latin typeface="JetBrains Mono"/>
+              </a:rPr>
+              <a:t/>
+            </a:r>
+            <a:br>
+              <a:rPr kumimoji="0" lang="de-DE" altLang="de-DE" sz="2000" b="0" i="0" u="none" strike="noStrike" cap="none" normalizeH="0" baseline="0" dirty="0" smtClean="0">
+                <a:ln>
+                  <a:noFill/>
+                </a:ln>
+                <a:solidFill>
+                  <a:srgbClr val="89CA78"/>
+                </a:solidFill>
+                <a:effectLst/>
+                <a:latin typeface="JetBrains Mono"/>
+              </a:rPr>
+            </a:br>
+            <a:r>
+              <a:rPr kumimoji="0" lang="de-DE" altLang="de-DE" sz="2000" b="0" i="0" u="none" strike="noStrike" cap="none" normalizeH="0" baseline="0" dirty="0" smtClean="0">
+                <a:ln>
+                  <a:noFill/>
+                </a:ln>
+                <a:solidFill>
+                  <a:srgbClr val="89CA78"/>
+                </a:solidFill>
+                <a:effectLst/>
+                <a:latin typeface="JetBrains Mono"/>
+              </a:rPr>
+              <a:t>  </a:t>
+            </a:r>
+            <a:r>
+              <a:rPr kumimoji="0" lang="de-DE" altLang="de-DE" sz="2000" b="0" i="0" u="none" strike="noStrike" cap="none" normalizeH="0" baseline="0" dirty="0" err="1" smtClean="0">
+                <a:ln>
+                  <a:noFill/>
+                </a:ln>
+                <a:solidFill>
+                  <a:srgbClr val="EF596F"/>
+                </a:solidFill>
+                <a:effectLst/>
+                <a:latin typeface="JetBrains Mono"/>
+              </a:rPr>
+              <a:t>bucket</a:t>
+            </a:r>
+            <a:r>
+              <a:rPr kumimoji="0" lang="de-DE" altLang="de-DE" sz="2000" b="0" i="0" u="none" strike="noStrike" cap="none" normalizeH="0" baseline="0" dirty="0" smtClean="0">
+                <a:ln>
+                  <a:noFill/>
+                </a:ln>
+                <a:solidFill>
+                  <a:srgbClr val="EF596F"/>
+                </a:solidFill>
+                <a:effectLst/>
+                <a:latin typeface="JetBrains Mono"/>
+              </a:rPr>
+              <a:t> </a:t>
+            </a:r>
+            <a:r>
+              <a:rPr kumimoji="0" lang="de-DE" altLang="de-DE" sz="2000" b="0" i="0" u="none" strike="noStrike" cap="none" normalizeH="0" baseline="0" dirty="0" smtClean="0">
+                <a:ln>
+                  <a:noFill/>
+                </a:ln>
+                <a:solidFill>
+                  <a:srgbClr val="BBBBBB"/>
+                </a:solidFill>
+                <a:effectLst/>
+                <a:latin typeface="JetBrains Mono"/>
+              </a:rPr>
+              <a:t>= </a:t>
+            </a:r>
+            <a:r>
+              <a:rPr kumimoji="0" lang="de-DE" altLang="de-DE" sz="2000" b="0" i="0" u="none" strike="noStrike" cap="none" normalizeH="0" baseline="0" dirty="0" err="1" smtClean="0">
+                <a:ln>
+                  <a:noFill/>
+                </a:ln>
+                <a:solidFill>
+                  <a:srgbClr val="BBBBBB"/>
+                </a:solidFill>
+                <a:effectLst/>
+                <a:latin typeface="JetBrains Mono"/>
+              </a:rPr>
+              <a:t>var.</a:t>
+            </a:r>
+            <a:r>
+              <a:rPr kumimoji="0" lang="de-DE" altLang="de-DE" sz="2000" b="0" i="0" u="none" strike="noStrike" cap="none" normalizeH="0" baseline="0" dirty="0" err="1" smtClean="0">
+                <a:ln>
+                  <a:noFill/>
+                </a:ln>
+                <a:solidFill>
+                  <a:srgbClr val="EF596F"/>
+                </a:solidFill>
+                <a:effectLst/>
+                <a:latin typeface="JetBrains Mono"/>
+              </a:rPr>
+              <a:t>demo_bucket</a:t>
+            </a:r>
+            <a:r>
+              <a:rPr kumimoji="0" lang="de-DE" altLang="de-DE" sz="2000" b="0" i="0" u="none" strike="noStrike" cap="none" normalizeH="0" baseline="0" dirty="0" smtClean="0">
+                <a:ln>
+                  <a:noFill/>
+                </a:ln>
+                <a:solidFill>
+                  <a:srgbClr val="EF596F"/>
+                </a:solidFill>
+                <a:effectLst/>
+                <a:latin typeface="JetBrains Mono"/>
+              </a:rPr>
+              <a:t/>
+            </a:r>
+            <a:br>
+              <a:rPr kumimoji="0" lang="de-DE" altLang="de-DE" sz="2000" b="0" i="0" u="none" strike="noStrike" cap="none" normalizeH="0" baseline="0" dirty="0" smtClean="0">
+                <a:ln>
+                  <a:noFill/>
+                </a:ln>
+                <a:solidFill>
+                  <a:srgbClr val="EF596F"/>
+                </a:solidFill>
+                <a:effectLst/>
+                <a:latin typeface="JetBrains Mono"/>
+              </a:rPr>
+            </a:br>
+            <a:r>
+              <a:rPr kumimoji="0" lang="de-DE" altLang="de-DE" sz="2000" b="0" i="0" u="none" strike="noStrike" cap="none" normalizeH="0" baseline="0" dirty="0" smtClean="0">
+                <a:ln>
+                  <a:noFill/>
+                </a:ln>
+                <a:solidFill>
+                  <a:srgbClr val="EF596F"/>
+                </a:solidFill>
+                <a:effectLst/>
+                <a:latin typeface="JetBrains Mono"/>
+              </a:rPr>
+              <a:t>  </a:t>
+            </a:r>
+            <a:r>
+              <a:rPr kumimoji="0" lang="de-DE" altLang="de-DE" sz="2000" b="0" i="0" u="none" strike="noStrike" cap="none" normalizeH="0" baseline="0" dirty="0" err="1" smtClean="0">
+                <a:ln>
+                  <a:noFill/>
+                </a:ln>
+                <a:solidFill>
+                  <a:srgbClr val="EF596F"/>
+                </a:solidFill>
+                <a:effectLst/>
+                <a:latin typeface="JetBrains Mono"/>
+              </a:rPr>
+              <a:t>acl</a:t>
+            </a:r>
+            <a:r>
+              <a:rPr kumimoji="0" lang="de-DE" altLang="de-DE" sz="2000" b="0" i="0" u="none" strike="noStrike" cap="none" normalizeH="0" baseline="0" dirty="0" smtClean="0">
+                <a:ln>
+                  <a:noFill/>
+                </a:ln>
+                <a:solidFill>
+                  <a:srgbClr val="EF596F"/>
+                </a:solidFill>
+                <a:effectLst/>
+                <a:latin typeface="JetBrains Mono"/>
+              </a:rPr>
+              <a:t>    </a:t>
+            </a:r>
+            <a:r>
+              <a:rPr kumimoji="0" lang="de-DE" altLang="de-DE" sz="2000" b="0" i="0" u="none" strike="noStrike" cap="none" normalizeH="0" baseline="0" dirty="0" smtClean="0">
+                <a:ln>
+                  <a:noFill/>
+                </a:ln>
+                <a:solidFill>
+                  <a:srgbClr val="BBBBBB"/>
+                </a:solidFill>
+                <a:effectLst/>
+                <a:latin typeface="JetBrains Mono"/>
+              </a:rPr>
+              <a:t>= </a:t>
+            </a:r>
+            <a:r>
+              <a:rPr kumimoji="0" lang="de-DE" altLang="de-DE" sz="2000" b="0" i="0" u="none" strike="noStrike" cap="none" normalizeH="0" baseline="0" dirty="0" smtClean="0">
+                <a:ln>
+                  <a:noFill/>
+                </a:ln>
+                <a:solidFill>
+                  <a:srgbClr val="89CA78"/>
+                </a:solidFill>
+                <a:effectLst/>
+                <a:latin typeface="JetBrains Mono"/>
+              </a:rPr>
+              <a:t>"private"</a:t>
+            </a:r>
+            <a:br>
+              <a:rPr kumimoji="0" lang="de-DE" altLang="de-DE" sz="2000" b="0" i="0" u="none" strike="noStrike" cap="none" normalizeH="0" baseline="0" dirty="0" smtClean="0">
+                <a:ln>
+                  <a:noFill/>
+                </a:ln>
+                <a:solidFill>
+                  <a:srgbClr val="89CA78"/>
+                </a:solidFill>
+                <a:effectLst/>
+                <a:latin typeface="JetBrains Mono"/>
+              </a:rPr>
+            </a:br>
+            <a:r>
+              <a:rPr kumimoji="0" lang="de-DE" altLang="de-DE" sz="2000" b="0" i="0" u="none" strike="noStrike" cap="none" normalizeH="0" baseline="0" dirty="0" smtClean="0">
+                <a:ln>
+                  <a:noFill/>
+                </a:ln>
+                <a:solidFill>
+                  <a:srgbClr val="89CA78"/>
+                </a:solidFill>
+                <a:effectLst/>
+                <a:latin typeface="JetBrains Mono"/>
+              </a:rPr>
+              <a:t>  </a:t>
+            </a:r>
+            <a:r>
+              <a:rPr kumimoji="0" lang="de-DE" altLang="de-DE" sz="2000" b="0" i="0" u="none" strike="noStrike" cap="none" normalizeH="0" baseline="0" dirty="0" smtClean="0">
+                <a:ln>
+                  <a:noFill/>
+                </a:ln>
+                <a:solidFill>
+                  <a:srgbClr val="EF596F"/>
+                </a:solidFill>
+                <a:effectLst/>
+                <a:latin typeface="JetBrains Mono"/>
+              </a:rPr>
+              <a:t>tags   </a:t>
+            </a:r>
+            <a:r>
+              <a:rPr kumimoji="0" lang="de-DE" altLang="de-DE" sz="2000" b="0" i="0" u="none" strike="noStrike" cap="none" normalizeH="0" baseline="0" dirty="0" smtClean="0">
+                <a:ln>
+                  <a:noFill/>
+                </a:ln>
+                <a:solidFill>
+                  <a:srgbClr val="BBBBBB"/>
+                </a:solidFill>
+                <a:effectLst/>
+                <a:latin typeface="JetBrains Mono"/>
+              </a:rPr>
+              <a:t>= {</a:t>
+            </a:r>
+            <a:br>
+              <a:rPr kumimoji="0" lang="de-DE" altLang="de-DE" sz="2000" b="0" i="0" u="none" strike="noStrike" cap="none" normalizeH="0" baseline="0" dirty="0" smtClean="0">
+                <a:ln>
+                  <a:noFill/>
+                </a:ln>
+                <a:solidFill>
+                  <a:srgbClr val="BBBBBB"/>
+                </a:solidFill>
+                <a:effectLst/>
+                <a:latin typeface="JetBrains Mono"/>
+              </a:rPr>
+            </a:br>
+            <a:r>
+              <a:rPr kumimoji="0" lang="de-DE" altLang="de-DE" sz="2000" b="0" i="0" u="none" strike="noStrike" cap="none" normalizeH="0" baseline="0" dirty="0" smtClean="0">
+                <a:ln>
+                  <a:noFill/>
+                </a:ln>
+                <a:solidFill>
+                  <a:srgbClr val="BBBBBB"/>
+                </a:solidFill>
+                <a:effectLst/>
+                <a:latin typeface="JetBrains Mono"/>
+              </a:rPr>
+              <a:t>    </a:t>
+            </a:r>
+            <a:r>
+              <a:rPr kumimoji="0" lang="de-DE" altLang="de-DE" sz="2000" b="0" i="0" u="none" strike="noStrike" cap="none" normalizeH="0" baseline="0" dirty="0" err="1" smtClean="0">
+                <a:ln>
+                  <a:noFill/>
+                </a:ln>
+                <a:solidFill>
+                  <a:srgbClr val="EF596F"/>
+                </a:solidFill>
+                <a:effectLst/>
+                <a:latin typeface="JetBrains Mono"/>
+              </a:rPr>
+              <a:t>name</a:t>
+            </a:r>
+            <a:r>
+              <a:rPr kumimoji="0" lang="de-DE" altLang="de-DE" sz="2000" b="0" i="0" u="none" strike="noStrike" cap="none" normalizeH="0" baseline="0" dirty="0" smtClean="0">
+                <a:ln>
+                  <a:noFill/>
+                </a:ln>
+                <a:solidFill>
+                  <a:srgbClr val="EF596F"/>
+                </a:solidFill>
+                <a:effectLst/>
+                <a:latin typeface="JetBrains Mono"/>
+              </a:rPr>
+              <a:t> </a:t>
+            </a:r>
+            <a:r>
+              <a:rPr kumimoji="0" lang="de-DE" altLang="de-DE" sz="2000" b="0" i="0" u="none" strike="noStrike" cap="none" normalizeH="0" baseline="0" dirty="0" smtClean="0">
+                <a:ln>
+                  <a:noFill/>
+                </a:ln>
+                <a:solidFill>
+                  <a:srgbClr val="BBBBBB"/>
+                </a:solidFill>
+                <a:effectLst/>
+                <a:latin typeface="JetBrains Mono"/>
+              </a:rPr>
+              <a:t>= </a:t>
+            </a:r>
+            <a:r>
+              <a:rPr kumimoji="0" lang="de-DE" altLang="de-DE" sz="2000" b="0" i="0" u="none" strike="noStrike" cap="none" normalizeH="0" baseline="0" dirty="0" err="1" smtClean="0">
+                <a:ln>
+                  <a:noFill/>
+                </a:ln>
+                <a:solidFill>
+                  <a:srgbClr val="BBBBBB"/>
+                </a:solidFill>
+                <a:effectLst/>
+                <a:latin typeface="JetBrains Mono"/>
+              </a:rPr>
+              <a:t>var.</a:t>
+            </a:r>
+            <a:r>
+              <a:rPr kumimoji="0" lang="de-DE" altLang="de-DE" sz="2000" b="0" i="0" u="none" strike="noStrike" cap="none" normalizeH="0" baseline="0" dirty="0" err="1" smtClean="0">
+                <a:ln>
+                  <a:noFill/>
+                </a:ln>
+                <a:solidFill>
+                  <a:srgbClr val="EF596F"/>
+                </a:solidFill>
+                <a:effectLst/>
+                <a:latin typeface="JetBrains Mono"/>
+              </a:rPr>
+              <a:t>demo_bucket</a:t>
+            </a:r>
+            <a:r>
+              <a:rPr kumimoji="0" lang="de-DE" altLang="de-DE" sz="2000" b="0" i="0" u="none" strike="noStrike" cap="none" normalizeH="0" baseline="0" dirty="0" smtClean="0">
+                <a:ln>
+                  <a:noFill/>
+                </a:ln>
+                <a:solidFill>
+                  <a:srgbClr val="EF596F"/>
+                </a:solidFill>
+                <a:effectLst/>
+                <a:latin typeface="JetBrains Mono"/>
+              </a:rPr>
+              <a:t/>
+            </a:r>
+            <a:br>
+              <a:rPr kumimoji="0" lang="de-DE" altLang="de-DE" sz="2000" b="0" i="0" u="none" strike="noStrike" cap="none" normalizeH="0" baseline="0" dirty="0" smtClean="0">
+                <a:ln>
+                  <a:noFill/>
+                </a:ln>
+                <a:solidFill>
+                  <a:srgbClr val="EF596F"/>
+                </a:solidFill>
+                <a:effectLst/>
+                <a:latin typeface="JetBrains Mono"/>
+              </a:rPr>
+            </a:br>
+            <a:r>
+              <a:rPr kumimoji="0" lang="de-DE" altLang="de-DE" sz="2000" b="0" i="0" u="none" strike="noStrike" cap="none" normalizeH="0" baseline="0" dirty="0" smtClean="0">
+                <a:ln>
+                  <a:noFill/>
+                </a:ln>
+                <a:solidFill>
+                  <a:srgbClr val="EF596F"/>
+                </a:solidFill>
+                <a:effectLst/>
+                <a:latin typeface="JetBrains Mono"/>
+              </a:rPr>
+              <a:t>  </a:t>
+            </a:r>
+            <a:r>
+              <a:rPr kumimoji="0" lang="de-DE" altLang="de-DE" sz="2000" b="0" i="0" u="none" strike="noStrike" cap="none" normalizeH="0" baseline="0" dirty="0" smtClean="0">
+                <a:ln>
+                  <a:noFill/>
+                </a:ln>
+                <a:solidFill>
+                  <a:srgbClr val="BBBBBB"/>
+                </a:solidFill>
+                <a:effectLst/>
+                <a:latin typeface="JetBrains Mono"/>
+              </a:rPr>
+              <a:t>}</a:t>
+            </a:r>
+            <a:br>
+              <a:rPr kumimoji="0" lang="de-DE" altLang="de-DE" sz="2000" b="0" i="0" u="none" strike="noStrike" cap="none" normalizeH="0" baseline="0" dirty="0" smtClean="0">
+                <a:ln>
+                  <a:noFill/>
+                </a:ln>
+                <a:solidFill>
+                  <a:srgbClr val="BBBBBB"/>
+                </a:solidFill>
+                <a:effectLst/>
+                <a:latin typeface="JetBrains Mono"/>
+              </a:rPr>
+            </a:br>
+            <a:r>
+              <a:rPr kumimoji="0" lang="de-DE" altLang="de-DE" sz="2000" b="0" i="0" u="none" strike="noStrike" cap="none" normalizeH="0" baseline="0" dirty="0" smtClean="0">
+                <a:ln>
+                  <a:noFill/>
+                </a:ln>
+                <a:solidFill>
+                  <a:srgbClr val="BBBBBB"/>
+                </a:solidFill>
+                <a:effectLst/>
+                <a:latin typeface="JetBrains Mono"/>
+              </a:rPr>
+              <a:t>}</a:t>
+            </a:r>
+            <a:endParaRPr kumimoji="0" lang="de-DE" altLang="de-DE" sz="4400" b="0" i="0" u="none" strike="noStrike" cap="none" normalizeH="0" baseline="0" dirty="0" smtClean="0">
+              <a:ln>
+                <a:noFill/>
+              </a:ln>
+              <a:solidFill>
+                <a:schemeClr val="tx1"/>
+              </a:solidFill>
+              <a:effectLst/>
+              <a:latin typeface="Arial" panose="020B0604020202020204" pitchFamily="34" charset="0"/>
+            </a:endParaRPr>
+          </a:p>
+        </p:txBody>
+      </p:sp>
+      <p:pic>
+        <p:nvPicPr>
+          <p:cNvPr id="6" name="Grafik 5"/>
+          <p:cNvPicPr>
+            <a:picLocks noChangeAspect="1"/>
+          </p:cNvPicPr>
+          <p:nvPr/>
+        </p:nvPicPr>
+        <p:blipFill>
+          <a:blip r:embed="rId4"/>
+          <a:stretch>
+            <a:fillRect/>
+          </a:stretch>
+        </p:blipFill>
+        <p:spPr>
+          <a:xfrm>
+            <a:off x="6629222" y="2873512"/>
+            <a:ext cx="5364339" cy="3170099"/>
+          </a:xfrm>
+          <a:prstGeom prst="rect">
+            <a:avLst/>
+          </a:prstGeom>
+          <a:ln>
+            <a:solidFill>
+              <a:schemeClr val="tx1"/>
+            </a:solidFill>
+          </a:ln>
+        </p:spPr>
+      </p:pic>
+    </p:spTree>
+    <p:extLst>
+      <p:ext uri="{BB962C8B-B14F-4D97-AF65-F5344CB8AC3E}">
+        <p14:creationId xmlns:p14="http://schemas.microsoft.com/office/powerpoint/2010/main" val="3900226877"/>
       </p:ext>
     </p:extLst>
   </p:cSld>

</xml_diff>